<commit_message>
Cập nhật một số thông tin báo cáo, giao diện
</commit_message>
<xml_diff>
--- a/Thu Muc Bao Cao/Báo Cáo Đề Tài.pptx
+++ b/Thu Muc Bao Cao/Báo Cáo Đề Tài.pptx
@@ -144,10 +144,6 @@
 </p:presentation>
 </file>
 
-<file path=ppt/revisionInfo.xml><?xml version="1.0" encoding="utf-8"?>
-<p1510:revInfo xmlns:a="http://schemas.openxmlformats.org/drawingml/2006/main" xmlns:r="http://schemas.openxmlformats.org/officeDocument/2006/relationships" xmlns:p1510="http://schemas.microsoft.com/office/powerpoint/2015/10/main"/>
-</file>
-
 <file path=ppt/notesMasters/notesMaster1.xml><?xml version="1.0" encoding="utf-8"?>
 <p:notesMaster xmlns:a="http://schemas.openxmlformats.org/drawingml/2006/main" xmlns:r="http://schemas.openxmlformats.org/officeDocument/2006/relationships" xmlns:p="http://schemas.openxmlformats.org/presentationml/2006/main">
   <p:cSld>
@@ -294,35 +290,35 @@
           <a:p>
             <a:pPr lvl="0"/>
             <a:r>
-              <a:rPr lang="en-US" smtClean="0"/>
+              <a:rPr lang="en-US"/>
               <a:t>Edit Master text styles</a:t>
             </a:r>
           </a:p>
           <a:p>
             <a:pPr lvl="1"/>
             <a:r>
-              <a:rPr lang="en-US" smtClean="0"/>
+              <a:rPr lang="en-US"/>
               <a:t>Second level</a:t>
             </a:r>
           </a:p>
           <a:p>
             <a:pPr lvl="2"/>
             <a:r>
-              <a:rPr lang="en-US" smtClean="0"/>
+              <a:rPr lang="en-US"/>
               <a:t>Third level</a:t>
             </a:r>
           </a:p>
           <a:p>
             <a:pPr lvl="3"/>
             <a:r>
-              <a:rPr lang="en-US" smtClean="0"/>
+              <a:rPr lang="en-US"/>
               <a:t>Fourth level</a:t>
             </a:r>
           </a:p>
           <a:p>
             <a:pPr lvl="4"/>
             <a:r>
-              <a:rPr lang="en-US" smtClean="0"/>
+              <a:rPr lang="en-US"/>
               <a:t>Fifth level</a:t>
             </a:r>
             <a:endParaRPr lang="vi-VN"/>
@@ -8247,10 +8243,9 @@
           <a:lstStyle/>
           <a:p>
             <a:r>
-              <a:rPr lang="en-US" sz="3500" dirty="0" smtClean="0"/>
+              <a:rPr lang="en-US" sz="3500" dirty="0"/>
               <a:t>Đề tài: Hệ thống quản lí hộ khẩu</a:t>
             </a:r>
-            <a:endParaRPr lang="en-US" sz="3500" dirty="0"/>
           </a:p>
         </p:txBody>
       </p:sp>
@@ -8449,7 +8444,7 @@
           </a:lstStyle>
           <a:p>
             <a:r>
-              <a:rPr lang="en-US" sz="3000" kern="0" dirty="0" smtClean="0">
+              <a:rPr lang="en-US" sz="3000" kern="0" dirty="0">
                 <a:solidFill>
                   <a:schemeClr val="tx1"/>
                 </a:solidFill>
@@ -8458,7 +8453,7 @@
               <a:t>Báo Cáo Môn Học</a:t>
             </a:r>
             <a:br>
-              <a:rPr lang="en-US" sz="3000" kern="0" dirty="0" smtClean="0">
+              <a:rPr lang="en-US" sz="3000" kern="0" dirty="0">
                 <a:solidFill>
                   <a:schemeClr val="tx1"/>
                 </a:solidFill>
@@ -8466,7 +8461,7 @@
               </a:rPr>
             </a:br>
             <a:r>
-              <a:rPr lang="en-US" sz="3000" kern="0" dirty="0" smtClean="0">
+              <a:rPr lang="en-US" sz="3000" kern="0" dirty="0">
                 <a:solidFill>
                   <a:schemeClr val="tx1"/>
                 </a:solidFill>
@@ -8475,7 +8470,7 @@
               <a:t>Ph</a:t>
             </a:r>
             <a:r>
-              <a:rPr lang="vi-VN" sz="3000" kern="0" dirty="0" smtClean="0">
+              <a:rPr lang="vi-VN" sz="3000" kern="0" dirty="0">
                 <a:solidFill>
                   <a:schemeClr val="tx1"/>
                 </a:solidFill>
@@ -8484,7 +8479,7 @@
               <a:t>ư</a:t>
             </a:r>
             <a:r>
-              <a:rPr lang="en-US" sz="3000" kern="0" dirty="0" smtClean="0">
+              <a:rPr lang="en-US" sz="3000" kern="0" dirty="0">
                 <a:solidFill>
                   <a:schemeClr val="tx1"/>
                 </a:solidFill>
@@ -8493,7 +8488,7 @@
               <a:t>ơng Pháp Phát Triển Phần Mềm H</a:t>
             </a:r>
             <a:r>
-              <a:rPr lang="vi-VN" sz="3000" kern="0" dirty="0" smtClean="0">
+              <a:rPr lang="vi-VN" sz="3000" kern="0" dirty="0">
                 <a:solidFill>
                   <a:schemeClr val="tx1"/>
                 </a:solidFill>
@@ -8502,7 +8497,7 @@
               <a:t>ư</a:t>
             </a:r>
             <a:r>
-              <a:rPr lang="en-US" sz="3000" kern="0" dirty="0" smtClean="0">
+              <a:rPr lang="en-US" sz="3000" kern="0" dirty="0">
                 <a:solidFill>
                   <a:schemeClr val="tx1"/>
                 </a:solidFill>
@@ -8511,7 +8506,7 @@
               <a:t>ớng Đối T</a:t>
             </a:r>
             <a:r>
-              <a:rPr lang="vi-VN" sz="3000" kern="0" dirty="0" smtClean="0">
+              <a:rPr lang="vi-VN" sz="3000" kern="0" dirty="0">
                 <a:solidFill>
                   <a:schemeClr val="tx1"/>
                 </a:solidFill>
@@ -8520,7 +8515,7 @@
               <a:t>ư</a:t>
             </a:r>
             <a:r>
-              <a:rPr lang="en-US" sz="3000" kern="0" dirty="0" smtClean="0">
+              <a:rPr lang="en-US" sz="3000" kern="0" dirty="0">
                 <a:solidFill>
                   <a:schemeClr val="tx1"/>
                 </a:solidFill>
@@ -8528,12 +8523,6 @@
               </a:rPr>
               <a:t>ợng</a:t>
             </a:r>
-            <a:endParaRPr lang="en-US" sz="3000" kern="0" dirty="0">
-              <a:solidFill>
-                <a:schemeClr val="tx1"/>
-              </a:solidFill>
-              <a:latin typeface="+mn-lt"/>
-            </a:endParaRPr>
           </a:p>
         </p:txBody>
       </p:sp>
@@ -8919,21 +8908,8 @@
                   <a:schemeClr val="bg1"/>
                 </a:solidFill>
               </a:rPr>
-              <a:t>Võ Sĩ Vai		</a:t>
-            </a:r>
-            <a:r>
-              <a:rPr lang="vi-VN" dirty="0" smtClean="0">
-                <a:solidFill>
-                  <a:schemeClr val="bg1"/>
-                </a:solidFill>
-              </a:rPr>
-              <a:t>15520999</a:t>
-            </a:r>
-            <a:endParaRPr lang="vi-VN" dirty="0">
-              <a:solidFill>
-                <a:schemeClr val="bg1"/>
-              </a:solidFill>
-            </a:endParaRPr>
+              <a:t>Võ Sĩ Vai		15520999</a:t>
+            </a:r>
           </a:p>
           <a:p>
             <a:endParaRPr lang="vi-VN" dirty="0"/>
@@ -8950,13 +8926,6 @@
   <p:clrMapOvr>
     <a:masterClrMapping/>
   </p:clrMapOvr>
-  <p:timing>
-    <p:tnLst>
-      <p:par>
-        <p:cTn id="1" dur="indefinite" restart="never" nodeType="tmRoot"/>
-      </p:par>
-    </p:tnLst>
-  </p:timing>
 </p:sld>
 </file>
 
@@ -8993,7 +8962,7 @@
           <a:lstStyle/>
           <a:p>
             <a:r>
-              <a:rPr lang="en-US" dirty="0" smtClean="0"/>
+              <a:rPr lang="en-US" dirty="0"/>
               <a:t>Mô hình Use-case</a:t>
             </a:r>
             <a:endParaRPr lang="vi-VN" dirty="0"/>
@@ -9075,13 +9044,6 @@
   <p:clrMapOvr>
     <a:masterClrMapping/>
   </p:clrMapOvr>
-  <p:timing>
-    <p:tnLst>
-      <p:par>
-        <p:cTn id="1" dur="indefinite" restart="never" nodeType="tmRoot"/>
-      </p:par>
-    </p:tnLst>
-  </p:timing>
 </p:sld>
 </file>
 
@@ -9118,7 +9080,7 @@
           <a:lstStyle/>
           <a:p>
             <a:r>
-              <a:rPr lang="en-US" dirty="0" smtClean="0"/>
+              <a:rPr lang="en-US" dirty="0"/>
               <a:t>Phân tích</a:t>
             </a:r>
             <a:endParaRPr lang="vi-VN" dirty="0"/>
@@ -9200,13 +9162,6 @@
   <p:clrMapOvr>
     <a:masterClrMapping/>
   </p:clrMapOvr>
-  <p:timing>
-    <p:tnLst>
-      <p:par>
-        <p:cTn id="1" dur="indefinite" restart="never" nodeType="tmRoot"/>
-      </p:par>
-    </p:tnLst>
-  </p:timing>
 </p:sld>
 </file>
 
@@ -9243,7 +9198,7 @@
           <a:lstStyle/>
           <a:p>
             <a:r>
-              <a:rPr lang="en-US" dirty="0" smtClean="0"/>
+              <a:rPr lang="en-US" dirty="0"/>
               <a:t>Thiết kế dữ liệu</a:t>
             </a:r>
             <a:endParaRPr lang="vi-VN" dirty="0"/>
@@ -9328,13 +9283,6 @@
   <p:clrMapOvr>
     <a:masterClrMapping/>
   </p:clrMapOvr>
-  <p:timing>
-    <p:tnLst>
-      <p:par>
-        <p:cTn id="1" dur="indefinite" restart="never" nodeType="tmRoot"/>
-      </p:par>
-    </p:tnLst>
-  </p:timing>
 </p:sld>
 </file>
 
@@ -9371,7 +9319,7 @@
           <a:lstStyle/>
           <a:p>
             <a:r>
-              <a:rPr lang="en-US" dirty="0" smtClean="0"/>
+              <a:rPr lang="en-US" dirty="0"/>
               <a:t>Thiết kế kiến trúc</a:t>
             </a:r>
             <a:endParaRPr lang="vi-VN" dirty="0"/>
@@ -11038,7 +10986,7 @@
           <a:lstStyle/>
           <a:p>
             <a:r>
-              <a:rPr lang="en-US" dirty="0" smtClean="0"/>
+              <a:rPr lang="en-US" dirty="0"/>
               <a:t>Giao diện</a:t>
             </a:r>
             <a:endParaRPr lang="vi-VN" dirty="0"/>
@@ -11068,7 +11016,7 @@
           <a:lstStyle/>
           <a:p>
             <a:r>
-              <a:rPr lang="en-US" sz="2500" dirty="0" smtClean="0"/>
+              <a:rPr lang="en-US" sz="2500" dirty="0"/>
               <a:t>Màn hình đăng nhập</a:t>
             </a:r>
             <a:endParaRPr lang="vi-VN" sz="2500" dirty="0"/>
@@ -11183,7 +11131,7 @@
           <a:lstStyle/>
           <a:p>
             <a:r>
-              <a:rPr lang="en-US" dirty="0" smtClean="0"/>
+              <a:rPr lang="en-US" dirty="0"/>
               <a:t>Giao diện</a:t>
             </a:r>
             <a:endParaRPr lang="vi-VN" dirty="0"/>
@@ -11213,7 +11161,7 @@
           <a:lstStyle/>
           <a:p>
             <a:r>
-              <a:rPr lang="en-US" sz="2500" dirty="0" smtClean="0"/>
+              <a:rPr lang="en-US" sz="2500" dirty="0"/>
               <a:t>Màn hình chính </a:t>
             </a:r>
             <a:endParaRPr lang="vi-VN" sz="2500" dirty="0"/>
@@ -11328,7 +11276,7 @@
           <a:lstStyle/>
           <a:p>
             <a:r>
-              <a:rPr lang="en-US" dirty="0" smtClean="0"/>
+              <a:rPr lang="en-US" dirty="0"/>
               <a:t>Kết luận</a:t>
             </a:r>
             <a:endParaRPr lang="vi-VN" dirty="0"/>
@@ -11358,7 +11306,7 @@
           <a:lstStyle/>
           <a:p>
             <a:r>
-              <a:rPr lang="en-US" sz="2500" dirty="0" smtClean="0"/>
+              <a:rPr lang="en-US" sz="2500" dirty="0"/>
               <a:t>Kết quả đạt được</a:t>
             </a:r>
             <a:endParaRPr lang="vi-VN" sz="2500" dirty="0"/>
@@ -11470,16 +11418,9 @@
                 <a:latin typeface="Times New Roman" panose="02020603050405020304" pitchFamily="18" charset="0"/>
                 <a:ea typeface="Times New Roman" panose="02020603050405020304" pitchFamily="18" charset="0"/>
               </a:rPr>
-              <a:t>Thực hiện kiểm thử phần mềm ở mức độ lập </a:t>
-            </a:r>
-            <a:r>
-              <a:rPr lang="fr-FR" sz="2500" dirty="0" smtClean="0">
-                <a:latin typeface="Times New Roman" panose="02020603050405020304" pitchFamily="18" charset="0"/>
-                <a:ea typeface="Times New Roman" panose="02020603050405020304" pitchFamily="18" charset="0"/>
-              </a:rPr>
-              <a:t>trình.</a:t>
-            </a:r>
-            <a:endParaRPr lang="en-US" sz="2500" dirty="0" smtClean="0">
+              <a:t>Thực hiện kiểm thử phần mềm ở mức độ lập trình.</a:t>
+            </a:r>
+            <a:endParaRPr lang="en-US" sz="2500" dirty="0">
               <a:latin typeface="Times New Roman" panose="02020603050405020304" pitchFamily="18" charset="0"/>
               <a:ea typeface="Times New Roman" panose="02020603050405020304" pitchFamily="18" charset="0"/>
             </a:endParaRPr>
@@ -11496,18 +11437,11 @@
               <a:buChar char="-"/>
             </a:pPr>
             <a:r>
-              <a:rPr lang="fr-FR" sz="2500" dirty="0" smtClean="0">
-                <a:latin typeface="Times New Roman" panose="02020603050405020304" pitchFamily="18" charset="0"/>
-                <a:ea typeface="Calibri" panose="020F0502020204030204" pitchFamily="34" charset="0"/>
-              </a:rPr>
-              <a:t>Hiểu </a:t>
-            </a:r>
-            <a:r>
               <a:rPr lang="fr-FR" sz="2500" dirty="0">
                 <a:latin typeface="Times New Roman" panose="02020603050405020304" pitchFamily="18" charset="0"/>
                 <a:ea typeface="Calibri" panose="020F0502020204030204" pitchFamily="34" charset="0"/>
               </a:rPr>
-              <a:t>và nắm được các kiến thức về mô hình 3 lớp, .Net C#, dvexpress, ngôn ngữ mô hình hóa hướng đối tượng UML, hệ quản trị csdl MySQL</a:t>
+              <a:t>Hiểu và nắm được các kiến thức về mô hình 3 lớp, .Net C#, dvexpress, ngôn ngữ mô hình hóa hướng đối tượng UML, hệ quản trị csdl MySQL</a:t>
             </a:r>
             <a:endParaRPr lang="vi-VN" sz="2500" dirty="0"/>
           </a:p>
@@ -11555,13 +11489,6 @@
   <p:clrMapOvr>
     <a:masterClrMapping/>
   </p:clrMapOvr>
-  <p:timing>
-    <p:tnLst>
-      <p:par>
-        <p:cTn id="1" dur="indefinite" restart="never" nodeType="tmRoot"/>
-      </p:par>
-    </p:tnLst>
-  </p:timing>
 </p:sld>
 </file>
 
@@ -11598,7 +11525,7 @@
           <a:lstStyle/>
           <a:p>
             <a:r>
-              <a:rPr lang="en-US" dirty="0" smtClean="0"/>
+              <a:rPr lang="en-US" dirty="0"/>
               <a:t>Hướng phát triển</a:t>
             </a:r>
             <a:endParaRPr lang="vi-VN" dirty="0"/>
@@ -11652,74 +11579,11 @@
               </a:spcAft>
             </a:pPr>
             <a:r>
-              <a:rPr lang="fr-FR" sz="2500" dirty="0" smtClean="0">
-                <a:latin typeface="Times New Roman" panose="02020603050405020304" pitchFamily="18" charset="0"/>
-                <a:ea typeface="Calibri" panose="020F0502020204030204" pitchFamily="34" charset="0"/>
-              </a:rPr>
-              <a:t>Thêm </a:t>
-            </a:r>
-            <a:r>
               <a:rPr lang="fr-FR" sz="2500" dirty="0">
                 <a:latin typeface="Times New Roman" panose="02020603050405020304" pitchFamily="18" charset="0"/>
                 <a:ea typeface="Calibri" panose="020F0502020204030204" pitchFamily="34" charset="0"/>
               </a:rPr>
-              <a:t>chức năng kết nối cơ sở dữ liệu qua mạng </a:t>
-            </a:r>
-            <a:r>
-              <a:rPr lang="fr-FR" sz="2500" dirty="0" smtClean="0">
-                <a:latin typeface="Times New Roman" panose="02020603050405020304" pitchFamily="18" charset="0"/>
-                <a:ea typeface="Calibri" panose="020F0502020204030204" pitchFamily="34" charset="0"/>
-              </a:rPr>
-              <a:t>internet. Mở </a:t>
-            </a:r>
-            <a:r>
-              <a:rPr lang="fr-FR" sz="2500" dirty="0">
-                <a:latin typeface="Times New Roman" panose="02020603050405020304" pitchFamily="18" charset="0"/>
-                <a:ea typeface="Calibri" panose="020F0502020204030204" pitchFamily="34" charset="0"/>
-              </a:rPr>
-              <a:t>rộng phạm vi của dự án này </a:t>
-            </a:r>
-            <a:r>
-              <a:rPr lang="fr-FR" sz="2500" dirty="0" smtClean="0">
-                <a:latin typeface="Times New Roman" panose="02020603050405020304" pitchFamily="18" charset="0"/>
-                <a:ea typeface="Calibri" panose="020F0502020204030204" pitchFamily="34" charset="0"/>
-              </a:rPr>
-              <a:t>, đồng </a:t>
-            </a:r>
-            <a:r>
-              <a:rPr lang="fr-FR" sz="2500" dirty="0">
-                <a:latin typeface="Times New Roman" panose="02020603050405020304" pitchFamily="18" charset="0"/>
-                <a:ea typeface="Calibri" panose="020F0502020204030204" pitchFamily="34" charset="0"/>
-              </a:rPr>
-              <a:t>bộ cơ sở dữ </a:t>
-            </a:r>
-            <a:r>
-              <a:rPr lang="fr-FR" sz="2500" dirty="0" smtClean="0">
-                <a:latin typeface="Times New Roman" panose="02020603050405020304" pitchFamily="18" charset="0"/>
-                <a:ea typeface="Calibri" panose="020F0502020204030204" pitchFamily="34" charset="0"/>
-              </a:rPr>
-              <a:t>liệu để </a:t>
-            </a:r>
-            <a:r>
-              <a:rPr lang="fr-FR" sz="2500" dirty="0">
-                <a:latin typeface="Times New Roman" panose="02020603050405020304" pitchFamily="18" charset="0"/>
-                <a:ea typeface="Calibri" panose="020F0502020204030204" pitchFamily="34" charset="0"/>
-              </a:rPr>
-              <a:t>triển khai trên phạm </a:t>
-            </a:r>
-            <a:r>
-              <a:rPr lang="fr-FR" sz="2500" dirty="0" smtClean="0">
-                <a:latin typeface="Times New Roman" panose="02020603050405020304" pitchFamily="18" charset="0"/>
-                <a:ea typeface="Calibri" panose="020F0502020204030204" pitchFamily="34" charset="0"/>
-              </a:rPr>
-              <a:t>vi </a:t>
-            </a:r>
-            <a:r>
-              <a:rPr lang="fr-FR" sz="2500" dirty="0">
-                <a:latin typeface="Times New Roman" panose="02020603050405020304" pitchFamily="18" charset="0"/>
-                <a:ea typeface="Calibri" panose="020F0502020204030204" pitchFamily="34" charset="0"/>
-              </a:rPr>
-              <a:t>rộng hơn, không chỉ áp dụng tại một xã phường.</a:t>
+              <a:t>Thêm chức năng kết nối cơ sở dữ liệu qua mạng internet. Mở rộng phạm vi của dự án này , đồng bộ cơ sở dữ liệu để triển khai trên phạm vi rộng hơn, không chỉ áp dụng tại một xã phường.</a:t>
             </a:r>
             <a:endParaRPr lang="vi-VN" sz="2500" dirty="0">
               <a:latin typeface="Times New Roman" panose="02020603050405020304" pitchFamily="18" charset="0"/>
@@ -11833,7 +11697,7 @@
               </a:spcAft>
             </a:pPr>
             <a:r>
-              <a:rPr lang="en-US" sz="3600" b="1" kern="10" dirty="0" smtClean="0">
+              <a:rPr lang="en-US" sz="3600" b="1" kern="10" dirty="0">
                 <a:ln w="19050">
                   <a:solidFill>
                     <a:srgbClr val="FFFFFF"/>
@@ -11872,43 +11736,6 @@
               </a:rPr>
               <a:t>Thanks for watching!</a:t>
             </a:r>
-            <a:endParaRPr lang="en-US" sz="3600" b="1" kern="10" dirty="0">
-              <a:ln w="19050">
-                <a:solidFill>
-                  <a:srgbClr val="FFFFFF"/>
-                </a:solidFill>
-                <a:round/>
-                <a:headEnd/>
-                <a:tailEnd/>
-              </a:ln>
-              <a:gradFill rotWithShape="1">
-                <a:gsLst>
-                  <a:gs pos="0">
-                    <a:srgbClr val="35BBE5"/>
-                  </a:gs>
-                  <a:gs pos="50000">
-                    <a:srgbClr val="35BBE5">
-                      <a:gamma/>
-                      <a:tint val="0"/>
-                      <a:invGamma/>
-                    </a:srgbClr>
-                  </a:gs>
-                  <a:gs pos="100000">
-                    <a:srgbClr val="35BBE5"/>
-                  </a:gs>
-                </a:gsLst>
-                <a:lin ang="0" scaled="1"/>
-              </a:gradFill>
-              <a:effectLst>
-                <a:outerShdw dist="63500" dir="2212194" algn="ctr" rotWithShape="0">
-                  <a:srgbClr val="868686">
-                    <a:alpha val="50000"/>
-                  </a:srgbClr>
-                </a:outerShdw>
-              </a:effectLst>
-              <a:latin typeface="Arial"/>
-              <a:cs typeface="Arial"/>
-            </a:endParaRPr>
           </a:p>
         </p:txBody>
       </p:sp>
@@ -12396,18 +12223,13 @@
                 </a:spcAft>
               </a:pPr>
               <a:r>
-                <a:rPr lang="en-US" b="1" dirty="0" smtClean="0">
+                <a:rPr lang="en-US" b="1" dirty="0">
                   <a:solidFill>
                     <a:srgbClr val="FFFFFF"/>
                   </a:solidFill>
                 </a:rPr>
                 <a:t>Phân tích</a:t>
               </a:r>
-              <a:endParaRPr lang="en-US" b="1" dirty="0">
-                <a:solidFill>
-                  <a:srgbClr val="FFFFFF"/>
-                </a:solidFill>
-              </a:endParaRPr>
             </a:p>
           </p:txBody>
         </p:sp>
@@ -12876,18 +12698,13 @@
                 </a:spcAft>
               </a:pPr>
               <a:r>
-                <a:rPr lang="en-US" b="1" dirty="0" smtClean="0">
+                <a:rPr lang="en-US" b="1" dirty="0">
                   <a:solidFill>
                     <a:srgbClr val="FFFFFF"/>
                   </a:solidFill>
                 </a:rPr>
                 <a:t>Thiết kế dữ liệu</a:t>
               </a:r>
-              <a:endParaRPr lang="en-US" b="1" dirty="0">
-                <a:solidFill>
-                  <a:srgbClr val="FFFFFF"/>
-                </a:solidFill>
-              </a:endParaRPr>
             </a:p>
           </p:txBody>
         </p:sp>
@@ -13356,18 +13173,13 @@
                 </a:spcAft>
               </a:pPr>
               <a:r>
-                <a:rPr lang="en-US" b="1" dirty="0" smtClean="0">
+                <a:rPr lang="en-US" b="1" dirty="0">
                   <a:solidFill>
                     <a:srgbClr val="FFFFFF"/>
                   </a:solidFill>
                 </a:rPr>
                 <a:t>Giao diện</a:t>
               </a:r>
-              <a:endParaRPr lang="en-US" b="1" dirty="0">
-                <a:solidFill>
-                  <a:srgbClr val="FFFFFF"/>
-                </a:solidFill>
-              </a:endParaRPr>
             </a:p>
           </p:txBody>
         </p:sp>
@@ -13836,18 +13648,13 @@
                 </a:spcAft>
               </a:pPr>
               <a:r>
-                <a:rPr lang="en-US" b="1" dirty="0" smtClean="0">
+                <a:rPr lang="en-US" b="1" dirty="0">
                   <a:solidFill>
                     <a:srgbClr val="FFFFFF"/>
                   </a:solidFill>
                 </a:rPr>
                 <a:t>Kết luận</a:t>
               </a:r>
-              <a:endParaRPr lang="en-US" b="1" dirty="0">
-                <a:solidFill>
-                  <a:srgbClr val="FFFFFF"/>
-                </a:solidFill>
-              </a:endParaRPr>
             </a:p>
           </p:txBody>
         </p:sp>
@@ -14316,18 +14123,13 @@
                 </a:spcAft>
               </a:pPr>
               <a:r>
-                <a:rPr lang="en-US" b="1" dirty="0" smtClean="0">
+                <a:rPr lang="en-US" b="1" dirty="0">
                   <a:solidFill>
                     <a:srgbClr val="FFFFFF"/>
                   </a:solidFill>
                 </a:rPr>
                 <a:t>Mô hình Use-case</a:t>
               </a:r>
-              <a:endParaRPr lang="en-US" b="1" dirty="0">
-                <a:solidFill>
-                  <a:srgbClr val="FFFFFF"/>
-                </a:solidFill>
-              </a:endParaRPr>
             </a:p>
           </p:txBody>
         </p:sp>
@@ -14796,18 +14598,13 @@
                 </a:spcAft>
               </a:pPr>
               <a:r>
-                <a:rPr lang="en-US" b="1" dirty="0" smtClean="0">
+                <a:rPr lang="en-US" b="1" dirty="0">
                   <a:solidFill>
                     <a:srgbClr val="FFFFFF"/>
                   </a:solidFill>
                 </a:rPr>
                 <a:t>Giới thiệu đề tài</a:t>
               </a:r>
-              <a:endParaRPr lang="en-US" b="1" dirty="0">
-                <a:solidFill>
-                  <a:srgbClr val="FFFFFF"/>
-                </a:solidFill>
-              </a:endParaRPr>
             </a:p>
           </p:txBody>
         </p:sp>
@@ -15276,18 +15073,13 @@
                 </a:spcAft>
               </a:pPr>
               <a:r>
-                <a:rPr lang="en-US" b="1" dirty="0" smtClean="0">
+                <a:rPr lang="en-US" b="1" dirty="0">
                   <a:solidFill>
                     <a:srgbClr val="FFFFFF"/>
                   </a:solidFill>
                 </a:rPr>
                 <a:t>Thiết kế kiến trúc</a:t>
               </a:r>
-              <a:endParaRPr lang="en-US" b="1" dirty="0">
-                <a:solidFill>
-                  <a:srgbClr val="FFFFFF"/>
-                </a:solidFill>
-              </a:endParaRPr>
             </a:p>
           </p:txBody>
         </p:sp>
@@ -15506,13 +15298,6 @@
   <p:clrMapOvr>
     <a:masterClrMapping/>
   </p:clrMapOvr>
-  <p:timing>
-    <p:tnLst>
-      <p:par>
-        <p:cTn id="1" dur="indefinite" restart="never" nodeType="tmRoot"/>
-      </p:par>
-    </p:tnLst>
-  </p:timing>
 </p:sld>
 </file>
 
@@ -15549,7 +15334,7 @@
           <a:lstStyle/>
           <a:p>
             <a:r>
-              <a:rPr lang="en-US" dirty="0" smtClean="0"/>
+              <a:rPr lang="en-US" dirty="0"/>
               <a:t>Giới thiệu đề tài</a:t>
             </a:r>
             <a:endParaRPr lang="en-US" sz="1600" dirty="0"/>
@@ -15582,25 +15367,11 @@
               <a:buChar char="-"/>
             </a:pPr>
             <a:r>
-              <a:rPr lang="en-US" sz="2500" dirty="0" smtClean="0">
-                <a:latin typeface="Times New Roman" panose="02020603050405020304" pitchFamily="18" charset="0"/>
-                <a:ea typeface="Times New Roman" panose="02020603050405020304" pitchFamily="18" charset="0"/>
-              </a:rPr>
-              <a:t>Hiện </a:t>
-            </a:r>
-            <a:r>
               <a:rPr lang="en-US" sz="2500" dirty="0">
                 <a:latin typeface="Times New Roman" panose="02020603050405020304" pitchFamily="18" charset="0"/>
                 <a:ea typeface="Times New Roman" panose="02020603050405020304" pitchFamily="18" charset="0"/>
               </a:rPr>
-              <a:t>tại, dân số Việt Nam là 96.691.993 </a:t>
-            </a:r>
-            <a:r>
-              <a:rPr lang="en-US" sz="2500" dirty="0" smtClean="0">
-                <a:latin typeface="Times New Roman" panose="02020603050405020304" pitchFamily="18" charset="0"/>
-                <a:ea typeface="Times New Roman" panose="02020603050405020304" pitchFamily="18" charset="0"/>
-              </a:rPr>
-              <a:t>người</a:t>
+              <a:t>Hiện tại, dân số Việt Nam là 96.691.993 người</a:t>
             </a:r>
           </a:p>
           <a:p>
@@ -15609,25 +15380,11 @@
               <a:buChar char="-"/>
             </a:pPr>
             <a:r>
-              <a:rPr lang="en-US" sz="2500" dirty="0" smtClean="0">
-                <a:latin typeface="Times New Roman" panose="02020603050405020304" pitchFamily="18" charset="0"/>
-                <a:ea typeface="Times New Roman" panose="02020603050405020304" pitchFamily="18" charset="0"/>
-              </a:rPr>
-              <a:t>Đứng </a:t>
-            </a:r>
-            <a:r>
               <a:rPr lang="en-US" sz="2500" dirty="0">
                 <a:latin typeface="Times New Roman" panose="02020603050405020304" pitchFamily="18" charset="0"/>
                 <a:ea typeface="Times New Roman" panose="02020603050405020304" pitchFamily="18" charset="0"/>
               </a:rPr>
-              <a:t>thứ 14 trên thế giới trong “bảng xếp hạng dân số các nước và vùng lãnh </a:t>
-            </a:r>
-            <a:r>
-              <a:rPr lang="en-US" sz="2500" dirty="0" smtClean="0">
-                <a:latin typeface="Times New Roman" panose="02020603050405020304" pitchFamily="18" charset="0"/>
-                <a:ea typeface="Times New Roman" panose="02020603050405020304" pitchFamily="18" charset="0"/>
-              </a:rPr>
-              <a:t>thổ”</a:t>
+              <a:t>Đứng thứ 14 trên thế giới trong “bảng xếp hạng dân số các nước và vùng lãnh thổ”</a:t>
             </a:r>
           </a:p>
           <a:p>
@@ -15636,25 +15393,11 @@
               <a:buChar char="-"/>
             </a:pPr>
             <a:r>
-              <a:rPr lang="en-US" sz="2500" dirty="0" smtClean="0">
-                <a:latin typeface="Times New Roman" panose="02020603050405020304" pitchFamily="18" charset="0"/>
-                <a:ea typeface="Times New Roman" panose="02020603050405020304" pitchFamily="18" charset="0"/>
-              </a:rPr>
-              <a:t>Dự </a:t>
-            </a:r>
-            <a:r>
               <a:rPr lang="en-US" sz="2500" dirty="0">
                 <a:latin typeface="Times New Roman" panose="02020603050405020304" pitchFamily="18" charset="0"/>
                 <a:ea typeface="Times New Roman" panose="02020603050405020304" pitchFamily="18" charset="0"/>
               </a:rPr>
-              <a:t>tính hết năm 2018, dân số của Việt Nam sẽ tăng thêm 1 triệu người</a:t>
-            </a:r>
-            <a:r>
-              <a:rPr lang="en-US" sz="2500" dirty="0" smtClean="0">
-                <a:latin typeface="Times New Roman" panose="02020603050405020304" pitchFamily="18" charset="0"/>
-                <a:ea typeface="Times New Roman" panose="02020603050405020304" pitchFamily="18" charset="0"/>
-              </a:rPr>
-              <a:t>.</a:t>
+              <a:t>Dự tính hết năm 2018, dân số của Việt Nam sẽ tăng thêm 1 triệu người.</a:t>
             </a:r>
           </a:p>
           <a:p>
@@ -15667,14 +15410,7 @@
                 <a:latin typeface="Times New Roman" panose="02020603050405020304" pitchFamily="18" charset="0"/>
                 <a:ea typeface="Calibri" panose="020F0502020204030204" pitchFamily="34" charset="0"/>
               </a:rPr>
-              <a:t>Dưới tác động của cách mạng khoa học công nghệ hiện đại, đặc biệt là công nghệ thông </a:t>
-            </a:r>
-            <a:r>
-              <a:rPr lang="en-US" sz="2500" dirty="0" smtClean="0">
-                <a:latin typeface="Times New Roman" panose="02020603050405020304" pitchFamily="18" charset="0"/>
-                <a:ea typeface="Calibri" panose="020F0502020204030204" pitchFamily="34" charset="0"/>
-              </a:rPr>
-              <a:t>tin.</a:t>
+              <a:t>Dưới tác động của cách mạng khoa học công nghệ hiện đại, đặc biệt là công nghệ thông tin.</a:t>
             </a:r>
             <a:endParaRPr lang="vi-VN" sz="2500" dirty="0"/>
           </a:p>
@@ -15722,13 +15458,6 @@
   <p:clrMapOvr>
     <a:masterClrMapping/>
   </p:clrMapOvr>
-  <p:timing>
-    <p:tnLst>
-      <p:par>
-        <p:cTn id="1" dur="indefinite" restart="never" nodeType="tmRoot"/>
-      </p:par>
-    </p:tnLst>
-  </p:timing>
 </p:sld>
 </file>
 
@@ -15765,7 +15494,7 @@
           <a:lstStyle/>
           <a:p>
             <a:r>
-              <a:rPr lang="en-US" dirty="0" smtClean="0"/>
+              <a:rPr lang="en-US" dirty="0"/>
               <a:t>Giới thiệu đề tài</a:t>
             </a:r>
             <a:endParaRPr lang="en-US" sz="1600" dirty="0"/>
@@ -15798,30 +15527,19 @@
               <a:buChar char="-"/>
             </a:pPr>
             <a:r>
-              <a:rPr lang="en-US" sz="2500" dirty="0" smtClean="0">
+              <a:rPr lang="en-US" sz="2500" dirty="0">
                 <a:latin typeface="Times New Roman" panose="02020603050405020304" pitchFamily="18" charset="0"/>
                 <a:ea typeface="Times New Roman" panose="02020603050405020304" pitchFamily="18" charset="0"/>
               </a:rPr>
               <a:t>S</a:t>
             </a:r>
             <a:r>
-              <a:rPr lang="en-US" sz="2500" dirty="0" smtClean="0">
-                <a:latin typeface="Times New Roman" panose="02020603050405020304" pitchFamily="18" charset="0"/>
-                <a:ea typeface="Calibri" panose="020F0502020204030204" pitchFamily="34" charset="0"/>
-              </a:rPr>
-              <a:t>ố </a:t>
-            </a:r>
-            <a:r>
               <a:rPr lang="en-US" sz="2500" dirty="0">
                 <a:latin typeface="Times New Roman" panose="02020603050405020304" pitchFamily="18" charset="0"/>
                 <a:ea typeface="Calibri" panose="020F0502020204030204" pitchFamily="34" charset="0"/>
               </a:rPr>
-              <a:t>lượng hộ khẩu trong một phường thường khá lớn dẫn đến việc quản lý khá phức tạp. </a:t>
-            </a:r>
-            <a:endParaRPr lang="en-US" sz="2500" dirty="0" smtClean="0">
-              <a:latin typeface="Times New Roman" panose="02020603050405020304" pitchFamily="18" charset="0"/>
-              <a:ea typeface="Calibri" panose="020F0502020204030204" pitchFamily="34" charset="0"/>
-            </a:endParaRPr>
+              <a:t>ố lượng hộ khẩu trong một phường thường khá lớn dẫn đến việc quản lý khá phức tạp. </a:t>
+            </a:r>
           </a:p>
           <a:p>
             <a:pPr marL="342900" indent="-342900">
@@ -15829,39 +15547,11 @@
               <a:buChar char="-"/>
             </a:pPr>
             <a:r>
-              <a:rPr lang="en-US" sz="2500" dirty="0" smtClean="0">
-                <a:latin typeface="Times New Roman" panose="02020603050405020304" pitchFamily="18" charset="0"/>
-                <a:ea typeface="Calibri" panose="020F0502020204030204" pitchFamily="34" charset="0"/>
-              </a:rPr>
-              <a:t>Qua thời </a:t>
-            </a:r>
-            <a:r>
               <a:rPr lang="en-US" sz="2500" dirty="0">
                 <a:latin typeface="Times New Roman" panose="02020603050405020304" pitchFamily="18" charset="0"/>
                 <a:ea typeface="Calibri" panose="020F0502020204030204" pitchFamily="34" charset="0"/>
               </a:rPr>
-              <a:t>gian </a:t>
-            </a:r>
-            <a:r>
-              <a:rPr lang="en-US" sz="2500" dirty="0" smtClean="0">
-                <a:latin typeface="Times New Roman" panose="02020603050405020304" pitchFamily="18" charset="0"/>
-                <a:ea typeface="Calibri" panose="020F0502020204030204" pitchFamily="34" charset="0"/>
-              </a:rPr>
-              <a:t>dài </a:t>
-            </a:r>
-            <a:r>
-              <a:rPr lang="en-US" sz="2500" dirty="0">
-                <a:latin typeface="Times New Roman" panose="02020603050405020304" pitchFamily="18" charset="0"/>
-                <a:ea typeface="Calibri" panose="020F0502020204030204" pitchFamily="34" charset="0"/>
-              </a:rPr>
-              <a:t>việc lưu trữ thông tin trên giấy tờ trở nên tốn kém và dễ bị nhầm </a:t>
-            </a:r>
-            <a:r>
-              <a:rPr lang="en-US" sz="2500" dirty="0" smtClean="0">
-                <a:latin typeface="Times New Roman" panose="02020603050405020304" pitchFamily="18" charset="0"/>
-                <a:ea typeface="Calibri" panose="020F0502020204030204" pitchFamily="34" charset="0"/>
-              </a:rPr>
-              <a:t>lẫn</a:t>
+              <a:t>Qua thời gian dài việc lưu trữ thông tin trên giấy tờ trở nên tốn kém và dễ bị nhầm lẫn</a:t>
             </a:r>
           </a:p>
           <a:p>
@@ -15876,10 +15566,6 @@
               </a:rPr>
               <a:t>Giấy tờ theo thời gian có thể bị cũ, bị rách, … </a:t>
             </a:r>
-            <a:endParaRPr lang="en-US" sz="2500" dirty="0" smtClean="0">
-              <a:latin typeface="Times New Roman" panose="02020603050405020304" pitchFamily="18" charset="0"/>
-              <a:ea typeface="Calibri" panose="020F0502020204030204" pitchFamily="34" charset="0"/>
-            </a:endParaRPr>
           </a:p>
           <a:p>
             <a:pPr marL="342900" indent="-342900">
@@ -15887,18 +15573,11 @@
               <a:buChar char="-"/>
             </a:pPr>
             <a:r>
-              <a:rPr lang="en-US" sz="2500" dirty="0" smtClean="0">
-                <a:latin typeface="Times New Roman" panose="02020603050405020304" pitchFamily="18" charset="0"/>
-                <a:ea typeface="Calibri" panose="020F0502020204030204" pitchFamily="34" charset="0"/>
-              </a:rPr>
-              <a:t>Việc </a:t>
-            </a:r>
-            <a:r>
               <a:rPr lang="en-US" sz="2500" dirty="0">
                 <a:latin typeface="Times New Roman" panose="02020603050405020304" pitchFamily="18" charset="0"/>
                 <a:ea typeface="Calibri" panose="020F0502020204030204" pitchFamily="34" charset="0"/>
               </a:rPr>
-              <a:t>tìm kiếm và thực hiện công việc gặp nhiều khó khăn khi người dân tới phường làm thủ tục cần thiết. </a:t>
+              <a:t>Việc tìm kiếm và thực hiện công việc gặp nhiều khó khăn khi người dân tới phường làm thủ tục cần thiết. </a:t>
             </a:r>
             <a:endParaRPr lang="vi-VN" sz="2500" dirty="0"/>
           </a:p>
@@ -15914,7 +15593,7 @@
               <a:buFontTx/>
               <a:buChar char="-"/>
             </a:pPr>
-            <a:endParaRPr lang="en-US" sz="2500" dirty="0" smtClean="0">
+            <a:endParaRPr lang="en-US" sz="2500" dirty="0">
               <a:latin typeface="Times New Roman" panose="02020603050405020304" pitchFamily="18" charset="0"/>
               <a:ea typeface="Calibri" panose="020F0502020204030204" pitchFamily="34" charset="0"/>
             </a:endParaRPr>
@@ -15970,13 +15649,6 @@
   <p:clrMapOvr>
     <a:masterClrMapping/>
   </p:clrMapOvr>
-  <p:timing>
-    <p:tnLst>
-      <p:par>
-        <p:cTn id="1" dur="indefinite" restart="never" nodeType="tmRoot"/>
-      </p:par>
-    </p:tnLst>
-  </p:timing>
 </p:sld>
 </file>
 
@@ -16013,7 +15685,7 @@
           <a:lstStyle/>
           <a:p>
             <a:r>
-              <a:rPr lang="en-US" dirty="0" smtClean="0"/>
+              <a:rPr lang="en-US" dirty="0"/>
               <a:t>Giới thiệu đề tài</a:t>
             </a:r>
             <a:endParaRPr lang="en-US" sz="1600" dirty="0"/>
@@ -16042,7 +15714,7 @@
           <a:lstStyle/>
           <a:p>
             <a:r>
-              <a:rPr lang="en-US" sz="2000" dirty="0" smtClean="0"/>
+              <a:rPr lang="en-US" sz="2000" dirty="0"/>
               <a:t>Hiện trạng của đơn vị cần xây dựng phần mềm</a:t>
             </a:r>
             <a:endParaRPr lang="vi-VN" sz="2000" dirty="0"/>
@@ -16052,7 +15724,7 @@
               <a:buFontTx/>
               <a:buChar char="-"/>
             </a:pPr>
-            <a:endParaRPr lang="en-US" sz="2000" dirty="0" smtClean="0">
+            <a:endParaRPr lang="en-US" sz="2000" dirty="0">
               <a:latin typeface="Times New Roman" panose="02020603050405020304" pitchFamily="18" charset="0"/>
               <a:ea typeface="Calibri" panose="020F0502020204030204" pitchFamily="34" charset="0"/>
             </a:endParaRPr>
@@ -16174,7 +15846,7 @@
           <a:lstStyle/>
           <a:p>
             <a:r>
-              <a:rPr lang="en-US" dirty="0" smtClean="0"/>
+              <a:rPr lang="en-US" dirty="0"/>
               <a:t>Giới thiệu đề tài</a:t>
             </a:r>
             <a:endParaRPr lang="vi-VN" dirty="0"/>
@@ -16204,7 +15876,7 @@
           <a:lstStyle/>
           <a:p>
             <a:r>
-              <a:rPr lang="en-US" sz="2500" dirty="0" smtClean="0"/>
+              <a:rPr lang="en-US" sz="2500" dirty="0"/>
               <a:t>Đánh giá hiện trạng</a:t>
             </a:r>
             <a:endParaRPr lang="vi-VN" sz="2500" dirty="0"/>
@@ -16241,18 +15913,11 @@
               </a:spcAft>
             </a:pPr>
             <a:r>
-              <a:rPr lang="en-US" sz="2500" b="1" dirty="0" smtClean="0">
-                <a:latin typeface="Times New Roman" panose="02020603050405020304" pitchFamily="18" charset="0"/>
-                <a:ea typeface="Calibri" panose="020F0502020204030204" pitchFamily="34" charset="0"/>
-              </a:rPr>
-              <a:t>1. Thiếu</a:t>
-            </a:r>
-            <a:r>
               <a:rPr lang="en-US" sz="2500" b="1" dirty="0">
                 <a:latin typeface="Times New Roman" panose="02020603050405020304" pitchFamily="18" charset="0"/>
                 <a:ea typeface="Calibri" panose="020F0502020204030204" pitchFamily="34" charset="0"/>
               </a:rPr>
-              <a:t>:</a:t>
+              <a:t>1. Thiếu:</a:t>
             </a:r>
             <a:endParaRPr lang="vi-VN" sz="2500" dirty="0">
               <a:latin typeface="Times New Roman" panose="02020603050405020304" pitchFamily="18" charset="0"/>
@@ -16298,16 +15963,9 @@
                 <a:latin typeface="Times New Roman" panose="02020603050405020304" pitchFamily="18" charset="0"/>
                 <a:ea typeface="Times New Roman" panose="02020603050405020304" pitchFamily="18" charset="0"/>
               </a:rPr>
-              <a:t>Một số xử lí còn thủ </a:t>
-            </a:r>
-            <a:r>
-              <a:rPr lang="en-US" sz="2500" dirty="0" smtClean="0">
-                <a:latin typeface="Times New Roman" panose="02020603050405020304" pitchFamily="18" charset="0"/>
-                <a:ea typeface="Times New Roman" panose="02020603050405020304" pitchFamily="18" charset="0"/>
-              </a:rPr>
-              <a:t>công</a:t>
-            </a:r>
-            <a:endParaRPr lang="vi-VN" sz="2500" dirty="0" smtClean="0">
+              <a:t>Một số xử lí còn thủ công</a:t>
+            </a:r>
+            <a:endParaRPr lang="vi-VN" sz="2500" dirty="0">
               <a:latin typeface="Times New Roman" panose="02020603050405020304" pitchFamily="18" charset="0"/>
               <a:ea typeface="Times New Roman" panose="02020603050405020304" pitchFamily="18" charset="0"/>
             </a:endParaRPr>
@@ -16322,13 +15980,13 @@
               </a:spcAft>
             </a:pPr>
             <a:r>
-              <a:rPr lang="en-US" sz="2500" b="1" dirty="0" smtClean="0">
+              <a:rPr lang="en-US" sz="2500" b="1" dirty="0">
                 <a:latin typeface="Times New Roman" panose="02020603050405020304" pitchFamily="18" charset="0"/>
                 <a:ea typeface="Calibri" panose="020F0502020204030204" pitchFamily="34" charset="0"/>
               </a:rPr>
               <a:t>2. Kém hiệu quả:</a:t>
             </a:r>
-            <a:endParaRPr lang="vi-VN" sz="2500" dirty="0" smtClean="0">
+            <a:endParaRPr lang="vi-VN" sz="2500" dirty="0">
               <a:latin typeface="Times New Roman" panose="02020603050405020304" pitchFamily="18" charset="0"/>
               <a:ea typeface="Calibri" panose="020F0502020204030204" pitchFamily="34" charset="0"/>
             </a:endParaRPr>
@@ -16345,18 +16003,11 @@
               <a:buChar char="-"/>
             </a:pPr>
             <a:r>
-              <a:rPr lang="en-US" sz="2500" dirty="0" smtClean="0">
-                <a:latin typeface="Times New Roman" panose="02020603050405020304" pitchFamily="18" charset="0"/>
-                <a:ea typeface="Times New Roman" panose="02020603050405020304" pitchFamily="18" charset="0"/>
-              </a:rPr>
-              <a:t>Hệ </a:t>
-            </a:r>
-            <a:r>
               <a:rPr lang="en-US" sz="2500" dirty="0">
                 <a:latin typeface="Times New Roman" panose="02020603050405020304" pitchFamily="18" charset="0"/>
                 <a:ea typeface="Times New Roman" panose="02020603050405020304" pitchFamily="18" charset="0"/>
               </a:rPr>
-              <a:t>thống tìm kiếm chưa hiệu quả</a:t>
+              <a:t>Hệ thống tìm kiếm chưa hiệu quả</a:t>
             </a:r>
             <a:endParaRPr lang="vi-VN" sz="2500" dirty="0">
               <a:latin typeface="Times New Roman" panose="02020603050405020304" pitchFamily="18" charset="0"/>
@@ -16419,18 +16070,11 @@
               </a:spcAft>
             </a:pPr>
             <a:r>
-              <a:rPr lang="en-US" sz="2500" b="1" dirty="0" smtClean="0">
-                <a:latin typeface="Times New Roman" panose="02020603050405020304" pitchFamily="18" charset="0"/>
-                <a:ea typeface="Calibri" panose="020F0502020204030204" pitchFamily="34" charset="0"/>
-              </a:rPr>
-              <a:t>3. Tốn </a:t>
-            </a:r>
-            <a:r>
               <a:rPr lang="en-US" sz="2500" b="1" dirty="0">
                 <a:latin typeface="Times New Roman" panose="02020603050405020304" pitchFamily="18" charset="0"/>
                 <a:ea typeface="Calibri" panose="020F0502020204030204" pitchFamily="34" charset="0"/>
               </a:rPr>
-              <a:t>kém:</a:t>
+              <a:t>3. Tốn kém:</a:t>
             </a:r>
             <a:endParaRPr lang="vi-VN" sz="2500" dirty="0">
               <a:latin typeface="Times New Roman" panose="02020603050405020304" pitchFamily="18" charset="0"/>
@@ -16587,7 +16231,7 @@
           <a:lstStyle/>
           <a:p>
             <a:r>
-              <a:rPr lang="en-US" dirty="0" smtClean="0"/>
+              <a:rPr lang="en-US" dirty="0"/>
               <a:t>Giới thiệu đề tài</a:t>
             </a:r>
             <a:endParaRPr lang="vi-VN" dirty="0"/>
@@ -16617,7 +16261,7 @@
           <a:lstStyle/>
           <a:p>
             <a:r>
-              <a:rPr lang="en-US" sz="2500" b="1" dirty="0" smtClean="0"/>
+              <a:rPr lang="en-US" sz="2500" b="1" dirty="0"/>
               <a:t>Tin học hóa các nghiệp vụ thủ công</a:t>
             </a:r>
             <a:endParaRPr lang="vi-VN" sz="2500" b="1" dirty="0"/>
@@ -16663,21 +16307,7 @@
                 <a:latin typeface="Times New Roman" panose="02020603050405020304" pitchFamily="18" charset="0"/>
                 <a:ea typeface="Times New Roman" panose="02020603050405020304" pitchFamily="18" charset="0"/>
               </a:rPr>
-              <a:t>C</a:t>
-            </a:r>
-            <a:r>
-              <a:rPr lang="en-US" sz="2500" dirty="0" smtClean="0">
-                <a:latin typeface="Times New Roman" panose="02020603050405020304" pitchFamily="18" charset="0"/>
-                <a:ea typeface="Times New Roman" panose="02020603050405020304" pitchFamily="18" charset="0"/>
-              </a:rPr>
-              <a:t>án </a:t>
-            </a:r>
-            <a:r>
-              <a:rPr lang="en-US" sz="2500" dirty="0">
-                <a:latin typeface="Times New Roman" panose="02020603050405020304" pitchFamily="18" charset="0"/>
-                <a:ea typeface="Times New Roman" panose="02020603050405020304" pitchFamily="18" charset="0"/>
-              </a:rPr>
-              <a:t>bộ chỉ cần tiếp nhận yêu cầu, lựa chọn nghiệp vụ và thực hiện theo các bước trong phần mềm.</a:t>
+              <a:t>Cán bộ chỉ cần tiếp nhận yêu cầu, lựa chọn nghiệp vụ và thực hiện theo các bước trong phần mềm.</a:t>
             </a:r>
             <a:endParaRPr lang="vi-VN" sz="2500" dirty="0">
               <a:latin typeface="Times New Roman" panose="02020603050405020304" pitchFamily="18" charset="0"/>
@@ -16699,26 +16329,107 @@
               </a:tabLst>
             </a:pPr>
             <a:r>
-              <a:rPr lang="en-US" sz="2500" dirty="0" smtClean="0">
-                <a:latin typeface="Times New Roman" panose="02020603050405020304" pitchFamily="18" charset="0"/>
-                <a:ea typeface="Times New Roman" panose="02020603050405020304" pitchFamily="18" charset="0"/>
-              </a:rPr>
-              <a:t>Phần </a:t>
-            </a:r>
-            <a:r>
               <a:rPr lang="en-US" sz="2500" dirty="0">
                 <a:latin typeface="Times New Roman" panose="02020603050405020304" pitchFamily="18" charset="0"/>
                 <a:ea typeface="Times New Roman" panose="02020603050405020304" pitchFamily="18" charset="0"/>
               </a:rPr>
-              <a:t>mềm sẽ giúp lưu trữ lại thông tin tiếp nhận yêu cầu cũng như các dữ liệu liên quan, lịch hẹn cũng như tình trạng hiện tại của yêu </a:t>
-            </a:r>
-            <a:r>
-              <a:rPr lang="en-US" sz="2500" dirty="0" smtClean="0">
+              <a:t>Phần mềm sẽ giúp lưu trữ lại thông tin tiếp nhận yêu cầu cũng như các dữ liệu </a:t>
+            </a:r>
+            <a:r>
+              <a:rPr lang="en-US" sz="2500" dirty="0" err="1">
                 <a:latin typeface="Times New Roman" panose="02020603050405020304" pitchFamily="18" charset="0"/>
                 <a:ea typeface="Times New Roman" panose="02020603050405020304" pitchFamily="18" charset="0"/>
               </a:rPr>
-              <a:t>cầu</a:t>
-            </a:r>
+              <a:t>liên</a:t>
+            </a:r>
+            <a:r>
+              <a:rPr lang="en-US" sz="2500" dirty="0">
+                <a:latin typeface="Times New Roman" panose="02020603050405020304" pitchFamily="18" charset="0"/>
+                <a:ea typeface="Times New Roman" panose="02020603050405020304" pitchFamily="18" charset="0"/>
+              </a:rPr>
+              <a:t> </a:t>
+            </a:r>
+            <a:r>
+              <a:rPr lang="en-US" sz="2500" dirty="0" err="1">
+                <a:latin typeface="Times New Roman" panose="02020603050405020304" pitchFamily="18" charset="0"/>
+                <a:ea typeface="Times New Roman" panose="02020603050405020304" pitchFamily="18" charset="0"/>
+              </a:rPr>
+              <a:t>quan</a:t>
+            </a:r>
+            <a:r>
+              <a:rPr lang="en-US" sz="2500" dirty="0">
+                <a:latin typeface="Times New Roman" panose="02020603050405020304" pitchFamily="18" charset="0"/>
+                <a:ea typeface="Times New Roman" panose="02020603050405020304" pitchFamily="18" charset="0"/>
+              </a:rPr>
+              <a:t> </a:t>
+            </a:r>
+            <a:r>
+              <a:rPr lang="en-US" sz="2500" dirty="0" err="1">
+                <a:latin typeface="Times New Roman" panose="02020603050405020304" pitchFamily="18" charset="0"/>
+                <a:ea typeface="Times New Roman" panose="02020603050405020304" pitchFamily="18" charset="0"/>
+              </a:rPr>
+              <a:t>đến</a:t>
+            </a:r>
+            <a:r>
+              <a:rPr lang="en-US" sz="2500" dirty="0">
+                <a:latin typeface="Times New Roman" panose="02020603050405020304" pitchFamily="18" charset="0"/>
+                <a:ea typeface="Times New Roman" panose="02020603050405020304" pitchFamily="18" charset="0"/>
+              </a:rPr>
+              <a:t> </a:t>
+            </a:r>
+            <a:r>
+              <a:rPr lang="en-US" sz="2500" dirty="0" err="1">
+                <a:latin typeface="Times New Roman" panose="02020603050405020304" pitchFamily="18" charset="0"/>
+                <a:ea typeface="Times New Roman" panose="02020603050405020304" pitchFamily="18" charset="0"/>
+              </a:rPr>
+              <a:t>hộ</a:t>
+            </a:r>
+            <a:r>
+              <a:rPr lang="en-US" sz="2500" dirty="0">
+                <a:latin typeface="Times New Roman" panose="02020603050405020304" pitchFamily="18" charset="0"/>
+                <a:ea typeface="Times New Roman" panose="02020603050405020304" pitchFamily="18" charset="0"/>
+              </a:rPr>
+              <a:t> </a:t>
+            </a:r>
+            <a:r>
+              <a:rPr lang="en-US" sz="2500" dirty="0" err="1">
+                <a:latin typeface="Times New Roman" panose="02020603050405020304" pitchFamily="18" charset="0"/>
+                <a:ea typeface="Times New Roman" panose="02020603050405020304" pitchFamily="18" charset="0"/>
+              </a:rPr>
+              <a:t>khẩu</a:t>
+            </a:r>
+            <a:r>
+              <a:rPr lang="en-US" sz="2500" dirty="0">
+                <a:latin typeface="Times New Roman" panose="02020603050405020304" pitchFamily="18" charset="0"/>
+                <a:ea typeface="Times New Roman" panose="02020603050405020304" pitchFamily="18" charset="0"/>
+              </a:rPr>
+              <a:t> </a:t>
+            </a:r>
+            <a:r>
+              <a:rPr lang="en-US" sz="2500" dirty="0" err="1">
+                <a:latin typeface="Times New Roman" panose="02020603050405020304" pitchFamily="18" charset="0"/>
+                <a:ea typeface="Times New Roman" panose="02020603050405020304" pitchFamily="18" charset="0"/>
+              </a:rPr>
+              <a:t>nhân</a:t>
+            </a:r>
+            <a:r>
+              <a:rPr lang="en-US" sz="2500" dirty="0">
+                <a:latin typeface="Times New Roman" panose="02020603050405020304" pitchFamily="18" charset="0"/>
+                <a:ea typeface="Times New Roman" panose="02020603050405020304" pitchFamily="18" charset="0"/>
+              </a:rPr>
+              <a:t> </a:t>
+            </a:r>
+            <a:r>
+              <a:rPr lang="en-US" sz="2500" dirty="0" err="1">
+                <a:latin typeface="Times New Roman" panose="02020603050405020304" pitchFamily="18" charset="0"/>
+                <a:ea typeface="Times New Roman" panose="02020603050405020304" pitchFamily="18" charset="0"/>
+              </a:rPr>
+              <a:t>khẩu</a:t>
+            </a:r>
+            <a:endParaRPr lang="en-US" sz="2500" dirty="0">
+              <a:latin typeface="Times New Roman" panose="02020603050405020304" pitchFamily="18" charset="0"/>
+              <a:ea typeface="Times New Roman" panose="02020603050405020304" pitchFamily="18" charset="0"/>
+            </a:endParaRPr>
           </a:p>
           <a:p>
             <a:pPr marL="342900" lvl="0" indent="-342900">
@@ -16735,18 +16446,480 @@
               </a:tabLst>
             </a:pPr>
             <a:r>
-              <a:rPr lang="en-US" sz="2500" dirty="0" smtClean="0">
+              <a:rPr lang="en-US" sz="2500" dirty="0" err="1">
                 <a:latin typeface="Times New Roman" panose="02020603050405020304" pitchFamily="18" charset="0"/>
                 <a:ea typeface="Times New Roman" panose="02020603050405020304" pitchFamily="18" charset="0"/>
               </a:rPr>
-              <a:t>Các mẫu </a:t>
+              <a:t>Các</a:t>
             </a:r>
             <a:r>
               <a:rPr lang="en-US" sz="2500" dirty="0">
                 <a:latin typeface="Times New Roman" panose="02020603050405020304" pitchFamily="18" charset="0"/>
                 <a:ea typeface="Times New Roman" panose="02020603050405020304" pitchFamily="18" charset="0"/>
               </a:rPr>
-              <a:t>đơn sẽ được điền hoàn toàn trên máy tính, người đến đăng kí chỉ việc kiểm tra và kí vào đơn sau khi đã hoàn thành.</a:t>
+              <a:t> </a:t>
+            </a:r>
+            <a:r>
+              <a:rPr lang="en-US" sz="2500" dirty="0" err="1">
+                <a:latin typeface="Times New Roman" panose="02020603050405020304" pitchFamily="18" charset="0"/>
+                <a:ea typeface="Times New Roman" panose="02020603050405020304" pitchFamily="18" charset="0"/>
+              </a:rPr>
+              <a:t>mẫu</a:t>
+            </a:r>
+            <a:r>
+              <a:rPr lang="en-US" sz="2500" dirty="0">
+                <a:latin typeface="Times New Roman" panose="02020603050405020304" pitchFamily="18" charset="0"/>
+                <a:ea typeface="Times New Roman" panose="02020603050405020304" pitchFamily="18" charset="0"/>
+              </a:rPr>
+              <a:t> </a:t>
+            </a:r>
+            <a:r>
+              <a:rPr lang="en-US" sz="2500" dirty="0" err="1">
+                <a:latin typeface="Times New Roman" panose="02020603050405020304" pitchFamily="18" charset="0"/>
+                <a:ea typeface="Times New Roman" panose="02020603050405020304" pitchFamily="18" charset="0"/>
+              </a:rPr>
+              <a:t>đơn</a:t>
+            </a:r>
+            <a:r>
+              <a:rPr lang="en-US" sz="2500" dirty="0">
+                <a:latin typeface="Times New Roman" panose="02020603050405020304" pitchFamily="18" charset="0"/>
+                <a:ea typeface="Times New Roman" panose="02020603050405020304" pitchFamily="18" charset="0"/>
+              </a:rPr>
+              <a:t> </a:t>
+            </a:r>
+            <a:r>
+              <a:rPr lang="en-US" sz="2500" dirty="0" err="1">
+                <a:latin typeface="Times New Roman" panose="02020603050405020304" pitchFamily="18" charset="0"/>
+                <a:ea typeface="Times New Roman" panose="02020603050405020304" pitchFamily="18" charset="0"/>
+              </a:rPr>
+              <a:t>sẽ</a:t>
+            </a:r>
+            <a:r>
+              <a:rPr lang="en-US" sz="2500" dirty="0">
+                <a:latin typeface="Times New Roman" panose="02020603050405020304" pitchFamily="18" charset="0"/>
+                <a:ea typeface="Times New Roman" panose="02020603050405020304" pitchFamily="18" charset="0"/>
+              </a:rPr>
+              <a:t> </a:t>
+            </a:r>
+            <a:r>
+              <a:rPr lang="en-US" sz="2500" dirty="0" err="1">
+                <a:latin typeface="Times New Roman" panose="02020603050405020304" pitchFamily="18" charset="0"/>
+                <a:ea typeface="Times New Roman" panose="02020603050405020304" pitchFamily="18" charset="0"/>
+              </a:rPr>
+              <a:t>được</a:t>
+            </a:r>
+            <a:r>
+              <a:rPr lang="en-US" sz="2500" dirty="0">
+                <a:latin typeface="Times New Roman" panose="02020603050405020304" pitchFamily="18" charset="0"/>
+                <a:ea typeface="Times New Roman" panose="02020603050405020304" pitchFamily="18" charset="0"/>
+              </a:rPr>
+              <a:t> </a:t>
+            </a:r>
+            <a:r>
+              <a:rPr lang="en-US" sz="2500" dirty="0" err="1">
+                <a:latin typeface="Times New Roman" panose="02020603050405020304" pitchFamily="18" charset="0"/>
+                <a:ea typeface="Times New Roman" panose="02020603050405020304" pitchFamily="18" charset="0"/>
+              </a:rPr>
+              <a:t>điền</a:t>
+            </a:r>
+            <a:r>
+              <a:rPr lang="en-US" sz="2500" dirty="0">
+                <a:latin typeface="Times New Roman" panose="02020603050405020304" pitchFamily="18" charset="0"/>
+                <a:ea typeface="Times New Roman" panose="02020603050405020304" pitchFamily="18" charset="0"/>
+              </a:rPr>
+              <a:t> </a:t>
+            </a:r>
+            <a:r>
+              <a:rPr lang="en-US" sz="2500" dirty="0" err="1">
+                <a:latin typeface="Times New Roman" panose="02020603050405020304" pitchFamily="18" charset="0"/>
+                <a:ea typeface="Times New Roman" panose="02020603050405020304" pitchFamily="18" charset="0"/>
+              </a:rPr>
+              <a:t>hoàn</a:t>
+            </a:r>
+            <a:r>
+              <a:rPr lang="en-US" sz="2500" dirty="0">
+                <a:latin typeface="Times New Roman" panose="02020603050405020304" pitchFamily="18" charset="0"/>
+                <a:ea typeface="Times New Roman" panose="02020603050405020304" pitchFamily="18" charset="0"/>
+              </a:rPr>
+              <a:t> </a:t>
+            </a:r>
+            <a:r>
+              <a:rPr lang="en-US" sz="2500" dirty="0" err="1">
+                <a:latin typeface="Times New Roman" panose="02020603050405020304" pitchFamily="18" charset="0"/>
+                <a:ea typeface="Times New Roman" panose="02020603050405020304" pitchFamily="18" charset="0"/>
+              </a:rPr>
+              <a:t>toàn</a:t>
+            </a:r>
+            <a:r>
+              <a:rPr lang="en-US" sz="2500" dirty="0">
+                <a:latin typeface="Times New Roman" panose="02020603050405020304" pitchFamily="18" charset="0"/>
+                <a:ea typeface="Times New Roman" panose="02020603050405020304" pitchFamily="18" charset="0"/>
+              </a:rPr>
+              <a:t> </a:t>
+            </a:r>
+            <a:r>
+              <a:rPr lang="en-US" sz="2500" dirty="0" err="1">
+                <a:latin typeface="Times New Roman" panose="02020603050405020304" pitchFamily="18" charset="0"/>
+                <a:ea typeface="Times New Roman" panose="02020603050405020304" pitchFamily="18" charset="0"/>
+              </a:rPr>
+              <a:t>trên</a:t>
+            </a:r>
+            <a:r>
+              <a:rPr lang="en-US" sz="2500" dirty="0">
+                <a:latin typeface="Times New Roman" panose="02020603050405020304" pitchFamily="18" charset="0"/>
+                <a:ea typeface="Times New Roman" panose="02020603050405020304" pitchFamily="18" charset="0"/>
+              </a:rPr>
+              <a:t> </a:t>
+            </a:r>
+            <a:r>
+              <a:rPr lang="en-US" sz="2500" dirty="0" err="1">
+                <a:latin typeface="Times New Roman" panose="02020603050405020304" pitchFamily="18" charset="0"/>
+                <a:ea typeface="Times New Roman" panose="02020603050405020304" pitchFamily="18" charset="0"/>
+              </a:rPr>
+              <a:t>máy</a:t>
+            </a:r>
+            <a:r>
+              <a:rPr lang="en-US" sz="2500" dirty="0">
+                <a:latin typeface="Times New Roman" panose="02020603050405020304" pitchFamily="18" charset="0"/>
+                <a:ea typeface="Times New Roman" panose="02020603050405020304" pitchFamily="18" charset="0"/>
+              </a:rPr>
+              <a:t> </a:t>
+            </a:r>
+            <a:r>
+              <a:rPr lang="en-US" sz="2500" dirty="0" err="1">
+                <a:latin typeface="Times New Roman" panose="02020603050405020304" pitchFamily="18" charset="0"/>
+                <a:ea typeface="Times New Roman" panose="02020603050405020304" pitchFamily="18" charset="0"/>
+              </a:rPr>
+              <a:t>tính</a:t>
+            </a:r>
+            <a:r>
+              <a:rPr lang="en-US" sz="2500" dirty="0">
+                <a:latin typeface="Times New Roman" panose="02020603050405020304" pitchFamily="18" charset="0"/>
+                <a:ea typeface="Times New Roman" panose="02020603050405020304" pitchFamily="18" charset="0"/>
+              </a:rPr>
+              <a:t>, </a:t>
+            </a:r>
+            <a:r>
+              <a:rPr lang="en-US" sz="2500" dirty="0" err="1">
+                <a:latin typeface="Times New Roman" panose="02020603050405020304" pitchFamily="18" charset="0"/>
+                <a:ea typeface="Times New Roman" panose="02020603050405020304" pitchFamily="18" charset="0"/>
+              </a:rPr>
+              <a:t>người</a:t>
+            </a:r>
+            <a:r>
+              <a:rPr lang="en-US" sz="2500" dirty="0">
+                <a:latin typeface="Times New Roman" panose="02020603050405020304" pitchFamily="18" charset="0"/>
+                <a:ea typeface="Times New Roman" panose="02020603050405020304" pitchFamily="18" charset="0"/>
+              </a:rPr>
+              <a:t> </a:t>
+            </a:r>
+            <a:r>
+              <a:rPr lang="en-US" sz="2500" dirty="0" err="1">
+                <a:latin typeface="Times New Roman" panose="02020603050405020304" pitchFamily="18" charset="0"/>
+                <a:ea typeface="Times New Roman" panose="02020603050405020304" pitchFamily="18" charset="0"/>
+              </a:rPr>
+              <a:t>đến</a:t>
+            </a:r>
+            <a:r>
+              <a:rPr lang="en-US" sz="2500" dirty="0">
+                <a:latin typeface="Times New Roman" panose="02020603050405020304" pitchFamily="18" charset="0"/>
+                <a:ea typeface="Times New Roman" panose="02020603050405020304" pitchFamily="18" charset="0"/>
+              </a:rPr>
+              <a:t> </a:t>
+            </a:r>
+            <a:r>
+              <a:rPr lang="en-US" sz="2500" dirty="0" err="1">
+                <a:latin typeface="Times New Roman" panose="02020603050405020304" pitchFamily="18" charset="0"/>
+                <a:ea typeface="Times New Roman" panose="02020603050405020304" pitchFamily="18" charset="0"/>
+              </a:rPr>
+              <a:t>đăng</a:t>
+            </a:r>
+            <a:r>
+              <a:rPr lang="en-US" sz="2500" dirty="0">
+                <a:latin typeface="Times New Roman" panose="02020603050405020304" pitchFamily="18" charset="0"/>
+                <a:ea typeface="Times New Roman" panose="02020603050405020304" pitchFamily="18" charset="0"/>
+              </a:rPr>
+              <a:t> </a:t>
+            </a:r>
+            <a:r>
+              <a:rPr lang="en-US" sz="2500" dirty="0" err="1">
+                <a:latin typeface="Times New Roman" panose="02020603050405020304" pitchFamily="18" charset="0"/>
+                <a:ea typeface="Times New Roman" panose="02020603050405020304" pitchFamily="18" charset="0"/>
+              </a:rPr>
+              <a:t>kí</a:t>
+            </a:r>
+            <a:r>
+              <a:rPr lang="en-US" sz="2500" dirty="0">
+                <a:latin typeface="Times New Roman" panose="02020603050405020304" pitchFamily="18" charset="0"/>
+                <a:ea typeface="Times New Roman" panose="02020603050405020304" pitchFamily="18" charset="0"/>
+              </a:rPr>
+              <a:t> </a:t>
+            </a:r>
+            <a:r>
+              <a:rPr lang="en-US" sz="2500" dirty="0" err="1">
+                <a:latin typeface="Times New Roman" panose="02020603050405020304" pitchFamily="18" charset="0"/>
+                <a:ea typeface="Times New Roman" panose="02020603050405020304" pitchFamily="18" charset="0"/>
+              </a:rPr>
+              <a:t>chỉ</a:t>
+            </a:r>
+            <a:r>
+              <a:rPr lang="en-US" sz="2500" dirty="0">
+                <a:latin typeface="Times New Roman" panose="02020603050405020304" pitchFamily="18" charset="0"/>
+                <a:ea typeface="Times New Roman" panose="02020603050405020304" pitchFamily="18" charset="0"/>
+              </a:rPr>
+              <a:t> </a:t>
+            </a:r>
+            <a:r>
+              <a:rPr lang="en-US" sz="2500" dirty="0" err="1">
+                <a:latin typeface="Times New Roman" panose="02020603050405020304" pitchFamily="18" charset="0"/>
+                <a:ea typeface="Times New Roman" panose="02020603050405020304" pitchFamily="18" charset="0"/>
+              </a:rPr>
+              <a:t>việc</a:t>
+            </a:r>
+            <a:r>
+              <a:rPr lang="en-US" sz="2500" dirty="0">
+                <a:latin typeface="Times New Roman" panose="02020603050405020304" pitchFamily="18" charset="0"/>
+                <a:ea typeface="Times New Roman" panose="02020603050405020304" pitchFamily="18" charset="0"/>
+              </a:rPr>
+              <a:t> </a:t>
+            </a:r>
+            <a:r>
+              <a:rPr lang="en-US" sz="2500" dirty="0" err="1">
+                <a:latin typeface="Times New Roman" panose="02020603050405020304" pitchFamily="18" charset="0"/>
+                <a:ea typeface="Times New Roman" panose="02020603050405020304" pitchFamily="18" charset="0"/>
+              </a:rPr>
+              <a:t>cung</a:t>
+            </a:r>
+            <a:r>
+              <a:rPr lang="en-US" sz="2500" dirty="0">
+                <a:latin typeface="Times New Roman" panose="02020603050405020304" pitchFamily="18" charset="0"/>
+                <a:ea typeface="Times New Roman" panose="02020603050405020304" pitchFamily="18" charset="0"/>
+              </a:rPr>
+              <a:t> </a:t>
+            </a:r>
+            <a:r>
+              <a:rPr lang="en-US" sz="2500" dirty="0" err="1">
+                <a:latin typeface="Times New Roman" panose="02020603050405020304" pitchFamily="18" charset="0"/>
+                <a:ea typeface="Times New Roman" panose="02020603050405020304" pitchFamily="18" charset="0"/>
+              </a:rPr>
+              <a:t>cấp</a:t>
+            </a:r>
+            <a:r>
+              <a:rPr lang="en-US" sz="2500" dirty="0">
+                <a:latin typeface="Times New Roman" panose="02020603050405020304" pitchFamily="18" charset="0"/>
+                <a:ea typeface="Times New Roman" panose="02020603050405020304" pitchFamily="18" charset="0"/>
+              </a:rPr>
+              <a:t> </a:t>
+            </a:r>
+            <a:r>
+              <a:rPr lang="en-US" sz="2500" dirty="0" err="1">
+                <a:latin typeface="Times New Roman" panose="02020603050405020304" pitchFamily="18" charset="0"/>
+                <a:ea typeface="Times New Roman" panose="02020603050405020304" pitchFamily="18" charset="0"/>
+              </a:rPr>
+              <a:t>mã</a:t>
+            </a:r>
+            <a:r>
+              <a:rPr lang="en-US" sz="2500" dirty="0">
+                <a:latin typeface="Times New Roman" panose="02020603050405020304" pitchFamily="18" charset="0"/>
+                <a:ea typeface="Times New Roman" panose="02020603050405020304" pitchFamily="18" charset="0"/>
+              </a:rPr>
+              <a:t> </a:t>
+            </a:r>
+            <a:r>
+              <a:rPr lang="en-US" sz="2500" dirty="0" err="1">
+                <a:latin typeface="Times New Roman" panose="02020603050405020304" pitchFamily="18" charset="0"/>
+                <a:ea typeface="Times New Roman" panose="02020603050405020304" pitchFamily="18" charset="0"/>
+              </a:rPr>
+              <a:t>định</a:t>
+            </a:r>
+            <a:r>
+              <a:rPr lang="en-US" sz="2500" dirty="0">
+                <a:latin typeface="Times New Roman" panose="02020603050405020304" pitchFamily="18" charset="0"/>
+                <a:ea typeface="Times New Roman" panose="02020603050405020304" pitchFamily="18" charset="0"/>
+              </a:rPr>
+              <a:t> </a:t>
+            </a:r>
+            <a:r>
+              <a:rPr lang="en-US" sz="2500" dirty="0" err="1">
+                <a:latin typeface="Times New Roman" panose="02020603050405020304" pitchFamily="18" charset="0"/>
+                <a:ea typeface="Times New Roman" panose="02020603050405020304" pitchFamily="18" charset="0"/>
+              </a:rPr>
+              <a:t>danh</a:t>
+            </a:r>
+            <a:r>
+              <a:rPr lang="en-US" sz="2500" dirty="0">
+                <a:latin typeface="Times New Roman" panose="02020603050405020304" pitchFamily="18" charset="0"/>
+                <a:ea typeface="Times New Roman" panose="02020603050405020304" pitchFamily="18" charset="0"/>
+              </a:rPr>
+              <a:t>(</a:t>
+            </a:r>
+            <a:r>
+              <a:rPr lang="en-US" sz="2500" dirty="0" err="1">
+                <a:latin typeface="Times New Roman" panose="02020603050405020304" pitchFamily="18" charset="0"/>
+                <a:ea typeface="Times New Roman" panose="02020603050405020304" pitchFamily="18" charset="0"/>
+              </a:rPr>
+              <a:t>số</a:t>
+            </a:r>
+            <a:r>
+              <a:rPr lang="en-US" sz="2500" dirty="0">
+                <a:latin typeface="Times New Roman" panose="02020603050405020304" pitchFamily="18" charset="0"/>
+                <a:ea typeface="Times New Roman" panose="02020603050405020304" pitchFamily="18" charset="0"/>
+              </a:rPr>
+              <a:t> CMND), </a:t>
+            </a:r>
+            <a:r>
+              <a:rPr lang="en-US" sz="2500" dirty="0" err="1">
+                <a:latin typeface="Times New Roman" panose="02020603050405020304" pitchFamily="18" charset="0"/>
+                <a:ea typeface="Times New Roman" panose="02020603050405020304" pitchFamily="18" charset="0"/>
+              </a:rPr>
+              <a:t>kiểm</a:t>
+            </a:r>
+            <a:r>
+              <a:rPr lang="en-US" sz="2500" dirty="0">
+                <a:latin typeface="Times New Roman" panose="02020603050405020304" pitchFamily="18" charset="0"/>
+                <a:ea typeface="Times New Roman" panose="02020603050405020304" pitchFamily="18" charset="0"/>
+              </a:rPr>
+              <a:t> </a:t>
+            </a:r>
+            <a:r>
+              <a:rPr lang="en-US" sz="2500" dirty="0" err="1">
+                <a:latin typeface="Times New Roman" panose="02020603050405020304" pitchFamily="18" charset="0"/>
+                <a:ea typeface="Times New Roman" panose="02020603050405020304" pitchFamily="18" charset="0"/>
+              </a:rPr>
+              <a:t>tra</a:t>
+            </a:r>
+            <a:r>
+              <a:rPr lang="en-US" sz="2500" dirty="0">
+                <a:latin typeface="Times New Roman" panose="02020603050405020304" pitchFamily="18" charset="0"/>
+                <a:ea typeface="Times New Roman" panose="02020603050405020304" pitchFamily="18" charset="0"/>
+              </a:rPr>
+              <a:t> </a:t>
+            </a:r>
+            <a:r>
+              <a:rPr lang="en-US" sz="2500" dirty="0" err="1">
+                <a:latin typeface="Times New Roman" panose="02020603050405020304" pitchFamily="18" charset="0"/>
+                <a:ea typeface="Times New Roman" panose="02020603050405020304" pitchFamily="18" charset="0"/>
+              </a:rPr>
+              <a:t>và</a:t>
+            </a:r>
+            <a:r>
+              <a:rPr lang="en-US" sz="2500" dirty="0">
+                <a:latin typeface="Times New Roman" panose="02020603050405020304" pitchFamily="18" charset="0"/>
+                <a:ea typeface="Times New Roman" panose="02020603050405020304" pitchFamily="18" charset="0"/>
+              </a:rPr>
+              <a:t> </a:t>
+            </a:r>
+            <a:r>
+              <a:rPr lang="en-US" sz="2500" dirty="0" err="1">
+                <a:latin typeface="Times New Roman" panose="02020603050405020304" pitchFamily="18" charset="0"/>
+                <a:ea typeface="Times New Roman" panose="02020603050405020304" pitchFamily="18" charset="0"/>
+              </a:rPr>
+              <a:t>xác</a:t>
+            </a:r>
+            <a:r>
+              <a:rPr lang="en-US" sz="2500" dirty="0">
+                <a:latin typeface="Times New Roman" panose="02020603050405020304" pitchFamily="18" charset="0"/>
+                <a:ea typeface="Times New Roman" panose="02020603050405020304" pitchFamily="18" charset="0"/>
+              </a:rPr>
+              <a:t> </a:t>
+            </a:r>
+            <a:r>
+              <a:rPr lang="en-US" sz="2500" dirty="0" err="1">
+                <a:latin typeface="Times New Roman" panose="02020603050405020304" pitchFamily="18" charset="0"/>
+                <a:ea typeface="Times New Roman" panose="02020603050405020304" pitchFamily="18" charset="0"/>
+              </a:rPr>
+              <a:t>nhận</a:t>
+            </a:r>
+            <a:r>
+              <a:rPr lang="en-US" sz="2500" dirty="0">
+                <a:latin typeface="Times New Roman" panose="02020603050405020304" pitchFamily="18" charset="0"/>
+                <a:ea typeface="Times New Roman" panose="02020603050405020304" pitchFamily="18" charset="0"/>
+              </a:rPr>
+              <a:t> </a:t>
+            </a:r>
+            <a:r>
+              <a:rPr lang="en-US" sz="2500" dirty="0" err="1">
+                <a:latin typeface="Times New Roman" panose="02020603050405020304" pitchFamily="18" charset="0"/>
+                <a:ea typeface="Times New Roman" panose="02020603050405020304" pitchFamily="18" charset="0"/>
+              </a:rPr>
+              <a:t>thông</a:t>
+            </a:r>
+            <a:r>
+              <a:rPr lang="en-US" sz="2500" dirty="0">
+                <a:latin typeface="Times New Roman" panose="02020603050405020304" pitchFamily="18" charset="0"/>
+                <a:ea typeface="Times New Roman" panose="02020603050405020304" pitchFamily="18" charset="0"/>
+              </a:rPr>
+              <a:t> tin </a:t>
+            </a:r>
+            <a:r>
+              <a:rPr lang="en-US" sz="2500" dirty="0" err="1">
+                <a:latin typeface="Times New Roman" panose="02020603050405020304" pitchFamily="18" charset="0"/>
+                <a:ea typeface="Times New Roman" panose="02020603050405020304" pitchFamily="18" charset="0"/>
+              </a:rPr>
+              <a:t>sau</a:t>
+            </a:r>
+            <a:r>
+              <a:rPr lang="en-US" sz="2500" dirty="0">
+                <a:latin typeface="Times New Roman" panose="02020603050405020304" pitchFamily="18" charset="0"/>
+                <a:ea typeface="Times New Roman" panose="02020603050405020304" pitchFamily="18" charset="0"/>
+              </a:rPr>
+              <a:t> </a:t>
+            </a:r>
+            <a:r>
+              <a:rPr lang="en-US" sz="2500" dirty="0" err="1">
+                <a:latin typeface="Times New Roman" panose="02020603050405020304" pitchFamily="18" charset="0"/>
+                <a:ea typeface="Times New Roman" panose="02020603050405020304" pitchFamily="18" charset="0"/>
+              </a:rPr>
+              <a:t>khi</a:t>
+            </a:r>
+            <a:r>
+              <a:rPr lang="en-US" sz="2500" dirty="0">
+                <a:latin typeface="Times New Roman" panose="02020603050405020304" pitchFamily="18" charset="0"/>
+                <a:ea typeface="Times New Roman" panose="02020603050405020304" pitchFamily="18" charset="0"/>
+              </a:rPr>
+              <a:t> </a:t>
+            </a:r>
+            <a:r>
+              <a:rPr lang="en-US" sz="2500" dirty="0" err="1">
+                <a:latin typeface="Times New Roman" panose="02020603050405020304" pitchFamily="18" charset="0"/>
+                <a:ea typeface="Times New Roman" panose="02020603050405020304" pitchFamily="18" charset="0"/>
+              </a:rPr>
+              <a:t>đã</a:t>
+            </a:r>
+            <a:r>
+              <a:rPr lang="en-US" sz="2500" dirty="0">
+                <a:latin typeface="Times New Roman" panose="02020603050405020304" pitchFamily="18" charset="0"/>
+                <a:ea typeface="Times New Roman" panose="02020603050405020304" pitchFamily="18" charset="0"/>
+              </a:rPr>
+              <a:t> </a:t>
+            </a:r>
+            <a:r>
+              <a:rPr lang="en-US" sz="2500" dirty="0" err="1">
+                <a:latin typeface="Times New Roman" panose="02020603050405020304" pitchFamily="18" charset="0"/>
+                <a:ea typeface="Times New Roman" panose="02020603050405020304" pitchFamily="18" charset="0"/>
+              </a:rPr>
+              <a:t>hoàn</a:t>
+            </a:r>
+            <a:r>
+              <a:rPr lang="en-US" sz="2500" dirty="0">
+                <a:latin typeface="Times New Roman" panose="02020603050405020304" pitchFamily="18" charset="0"/>
+                <a:ea typeface="Times New Roman" panose="02020603050405020304" pitchFamily="18" charset="0"/>
+              </a:rPr>
+              <a:t> </a:t>
+            </a:r>
+            <a:r>
+              <a:rPr lang="en-US" sz="2500" dirty="0" err="1">
+                <a:latin typeface="Times New Roman" panose="02020603050405020304" pitchFamily="18" charset="0"/>
+                <a:ea typeface="Times New Roman" panose="02020603050405020304" pitchFamily="18" charset="0"/>
+              </a:rPr>
+              <a:t>thành</a:t>
+            </a:r>
+            <a:r>
+              <a:rPr lang="en-US" sz="2500" dirty="0">
+                <a:latin typeface="Times New Roman" panose="02020603050405020304" pitchFamily="18" charset="0"/>
+                <a:ea typeface="Times New Roman" panose="02020603050405020304" pitchFamily="18" charset="0"/>
+              </a:rPr>
+              <a:t>.</a:t>
             </a:r>
             <a:endParaRPr lang="vi-VN" sz="2500" dirty="0">
               <a:latin typeface="Times New Roman" panose="02020603050405020304" pitchFamily="18" charset="0"/>
@@ -16768,39 +16941,18 @@
               </a:tabLst>
             </a:pPr>
             <a:r>
-              <a:rPr lang="en-US" sz="2500" dirty="0" smtClean="0">
+              <a:rPr lang="en-US" sz="2500" dirty="0" err="1">
                 <a:latin typeface="Times New Roman" panose="02020603050405020304" pitchFamily="18" charset="0"/>
                 <a:ea typeface="Times New Roman" panose="02020603050405020304" pitchFamily="18" charset="0"/>
               </a:rPr>
-              <a:t>Phần </a:t>
+              <a:t>Phần</a:t>
             </a:r>
             <a:r>
               <a:rPr lang="en-US" sz="2500" dirty="0">
                 <a:latin typeface="Times New Roman" panose="02020603050405020304" pitchFamily="18" charset="0"/>
                 <a:ea typeface="Times New Roman" panose="02020603050405020304" pitchFamily="18" charset="0"/>
               </a:rPr>
-              <a:t>mềm, với cơ sở dữ liệu </a:t>
-            </a:r>
-            <a:r>
-              <a:rPr lang="en-US" sz="2500" dirty="0" smtClean="0">
-                <a:latin typeface="Times New Roman" panose="02020603050405020304" pitchFamily="18" charset="0"/>
-                <a:ea typeface="Times New Roman" panose="02020603050405020304" pitchFamily="18" charset="0"/>
-              </a:rPr>
-              <a:t>có </a:t>
-            </a:r>
-            <a:r>
-              <a:rPr lang="en-US" sz="2500" dirty="0">
-                <a:latin typeface="Times New Roman" panose="02020603050405020304" pitchFamily="18" charset="0"/>
-                <a:ea typeface="Times New Roman" panose="02020603050405020304" pitchFamily="18" charset="0"/>
-              </a:rPr>
-              <a:t>thể hỗ trợ cán bộ trong việc tra cứu và kiểm tra </a:t>
-            </a:r>
-            <a:r>
-              <a:rPr lang="en-US" sz="2500" dirty="0" smtClean="0">
-                <a:latin typeface="Times New Roman" panose="02020603050405020304" pitchFamily="18" charset="0"/>
-                <a:ea typeface="Times New Roman" panose="02020603050405020304" pitchFamily="18" charset="0"/>
-              </a:rPr>
-              <a:t>thông tin để giải quyết các thủ tục hành chính nhanh chóng</a:t>
+              <a:t> mềm, với cơ sở dữ liệu có thể hỗ trợ cán bộ trong việc tra cứu và kiểm tra thông tin để giải quyết các thủ tục hành chính nhanh chóng</a:t>
             </a:r>
             <a:endParaRPr lang="vi-VN" sz="2500" dirty="0">
               <a:latin typeface="Times New Roman" panose="02020603050405020304" pitchFamily="18" charset="0"/>
@@ -16887,7 +17039,7 @@
           <a:lstStyle/>
           <a:p>
             <a:r>
-              <a:rPr lang="en-US" dirty="0" smtClean="0"/>
+              <a:rPr lang="en-US" dirty="0"/>
               <a:t>Giới thiệu đề tài</a:t>
             </a:r>
             <a:endParaRPr lang="vi-VN" dirty="0"/>
@@ -16973,18 +17125,11 @@
               </a:tabLst>
             </a:pPr>
             <a:r>
-              <a:rPr lang="en-US" sz="2500" dirty="0" smtClean="0">
-                <a:latin typeface="Times New Roman" panose="02020603050405020304" pitchFamily="18" charset="0"/>
-                <a:ea typeface="Times New Roman" panose="02020603050405020304" pitchFamily="18" charset="0"/>
-              </a:rPr>
-              <a:t>Với </a:t>
-            </a:r>
-            <a:r>
               <a:rPr lang="en-US" sz="2500" dirty="0">
                 <a:latin typeface="Times New Roman" panose="02020603050405020304" pitchFamily="18" charset="0"/>
                 <a:ea typeface="Times New Roman" panose="02020603050405020304" pitchFamily="18" charset="0"/>
               </a:rPr>
-              <a:t>sự hỗ trợ của phần mềm, cán bộ tiếp nhận chỉ cần lựa chọn nghiệp vụ, yêu cầu số chứng minh nhân dân từ người đăng kí nhập vào biểu mẫu, hệ thống sẽ tự hoàn thành các dữ liệu cần thiết khác. Sau đó, cán bộ chỉ việc in đơn, yêu cầu người đăng kí kiểm tra và kí vào đơn và yêu cầu các giấy tờ cần thiết khác, qua đó tiết kiệm thời gian để thực hiện các bước tiếp theo.</a:t>
+              <a:t>Với sự hỗ trợ của phần mềm, cán bộ tiếp nhận chỉ cần lựa chọn nghiệp vụ, yêu cầu số chứng minh nhân dân từ người đăng kí nhập vào biểu mẫu, hệ thống sẽ tự hoàn thành các dữ liệu cần thiết khác. Sau đó, cán bộ chỉ việc in đơn, yêu cầu người đăng kí kiểm tra và kí vào đơn và yêu cầu các giấy tờ cần thiết khác, qua đó tiết kiệm thời gian để thực hiện các bước tiếp theo.</a:t>
             </a:r>
             <a:endParaRPr lang="vi-VN" sz="2500" dirty="0">
               <a:latin typeface="Times New Roman" panose="02020603050405020304" pitchFamily="18" charset="0"/>
@@ -17006,18 +17151,95 @@
               </a:tabLst>
             </a:pPr>
             <a:r>
-              <a:rPr lang="en-US" sz="2500" dirty="0" smtClean="0">
-                <a:latin typeface="Times New Roman" panose="02020603050405020304" pitchFamily="18" charset="0"/>
-                <a:ea typeface="Times New Roman" panose="02020603050405020304" pitchFamily="18" charset="0"/>
-              </a:rPr>
-              <a:t>Với </a:t>
-            </a:r>
-            <a:r>
               <a:rPr lang="en-US" sz="2500" dirty="0">
                 <a:latin typeface="Times New Roman" panose="02020603050405020304" pitchFamily="18" charset="0"/>
                 <a:ea typeface="Times New Roman" panose="02020603050405020304" pitchFamily="18" charset="0"/>
               </a:rPr>
-              <a:t>sự giúp sức của phần mềm, các cán bộ có thể dễ dàng kiểm tra tình hình làm việc và tạo thống kê, báo cáo một cách nhanh chóng.</a:t>
+              <a:t>Với sự giúp sức của phần mềm, các cán bộ có thể dễ dàng </a:t>
+            </a:r>
+            <a:r>
+              <a:rPr lang="en-US" sz="2500" dirty="0" err="1">
+                <a:latin typeface="Times New Roman" panose="02020603050405020304" pitchFamily="18" charset="0"/>
+                <a:ea typeface="Times New Roman" panose="02020603050405020304" pitchFamily="18" charset="0"/>
+              </a:rPr>
+              <a:t>kiểm</a:t>
+            </a:r>
+            <a:r>
+              <a:rPr lang="en-US" sz="2500" dirty="0">
+                <a:latin typeface="Times New Roman" panose="02020603050405020304" pitchFamily="18" charset="0"/>
+                <a:ea typeface="Times New Roman" panose="02020603050405020304" pitchFamily="18" charset="0"/>
+              </a:rPr>
+              <a:t> </a:t>
+            </a:r>
+            <a:r>
+              <a:rPr lang="en-US" sz="2500" dirty="0" err="1">
+                <a:latin typeface="Times New Roman" panose="02020603050405020304" pitchFamily="18" charset="0"/>
+                <a:ea typeface="Times New Roman" panose="02020603050405020304" pitchFamily="18" charset="0"/>
+              </a:rPr>
+              <a:t>tra</a:t>
+            </a:r>
+            <a:r>
+              <a:rPr lang="en-US" sz="2500" dirty="0">
+                <a:latin typeface="Times New Roman" panose="02020603050405020304" pitchFamily="18" charset="0"/>
+                <a:ea typeface="Times New Roman" panose="02020603050405020304" pitchFamily="18" charset="0"/>
+              </a:rPr>
+              <a:t>, </a:t>
+            </a:r>
+            <a:r>
+              <a:rPr lang="en-US" sz="2500" dirty="0" err="1">
+                <a:latin typeface="Times New Roman" panose="02020603050405020304" pitchFamily="18" charset="0"/>
+                <a:ea typeface="Times New Roman" panose="02020603050405020304" pitchFamily="18" charset="0"/>
+              </a:rPr>
+              <a:t>tra</a:t>
+            </a:r>
+            <a:r>
+              <a:rPr lang="en-US" sz="2500" dirty="0">
+                <a:latin typeface="Times New Roman" panose="02020603050405020304" pitchFamily="18" charset="0"/>
+                <a:ea typeface="Times New Roman" panose="02020603050405020304" pitchFamily="18" charset="0"/>
+              </a:rPr>
+              <a:t> </a:t>
+            </a:r>
+            <a:r>
+              <a:rPr lang="en-US" sz="2500" dirty="0" err="1">
+                <a:latin typeface="Times New Roman" panose="02020603050405020304" pitchFamily="18" charset="0"/>
+                <a:ea typeface="Times New Roman" panose="02020603050405020304" pitchFamily="18" charset="0"/>
+              </a:rPr>
+              <a:t>cứu</a:t>
+            </a:r>
+            <a:r>
+              <a:rPr lang="en-US" sz="2500" dirty="0">
+                <a:latin typeface="Times New Roman" panose="02020603050405020304" pitchFamily="18" charset="0"/>
+                <a:ea typeface="Times New Roman" panose="02020603050405020304" pitchFamily="18" charset="0"/>
+              </a:rPr>
+              <a:t> </a:t>
+            </a:r>
+            <a:r>
+              <a:rPr lang="en-US" sz="2500" dirty="0" err="1">
+                <a:latin typeface="Times New Roman" panose="02020603050405020304" pitchFamily="18" charset="0"/>
+                <a:ea typeface="Times New Roman" panose="02020603050405020304" pitchFamily="18" charset="0"/>
+              </a:rPr>
+              <a:t>thông</a:t>
+            </a:r>
+            <a:r>
+              <a:rPr lang="en-US" sz="2500" dirty="0">
+                <a:latin typeface="Times New Roman" panose="02020603050405020304" pitchFamily="18" charset="0"/>
+                <a:ea typeface="Times New Roman" panose="02020603050405020304" pitchFamily="18" charset="0"/>
+              </a:rPr>
+              <a:t> tin </a:t>
+            </a:r>
+            <a:r>
+              <a:rPr lang="en-US" sz="2500" dirty="0" err="1">
+                <a:latin typeface="Times New Roman" panose="02020603050405020304" pitchFamily="18" charset="0"/>
+                <a:ea typeface="Times New Roman" panose="02020603050405020304" pitchFamily="18" charset="0"/>
+              </a:rPr>
+              <a:t>và</a:t>
+            </a:r>
+            <a:r>
+              <a:rPr lang="en-US" sz="2500" dirty="0">
+                <a:latin typeface="Times New Roman" panose="02020603050405020304" pitchFamily="18" charset="0"/>
+                <a:ea typeface="Times New Roman" panose="02020603050405020304" pitchFamily="18" charset="0"/>
+              </a:rPr>
+              <a:t> tạo thống kê, báo cáo một cách nhanh chóng.</a:t>
             </a:r>
             <a:endParaRPr lang="vi-VN" sz="2500" dirty="0">
               <a:latin typeface="Times New Roman" panose="02020603050405020304" pitchFamily="18" charset="0"/>
@@ -17104,7 +17326,7 @@
           <a:lstStyle/>
           <a:p>
             <a:r>
-              <a:rPr lang="en-US" dirty="0" smtClean="0"/>
+              <a:rPr lang="en-US" dirty="0"/>
               <a:t>Giới thiệu đề tài</a:t>
             </a:r>
             <a:endParaRPr lang="vi-VN" dirty="0"/>
@@ -17152,7 +17374,7 @@
         <p:spPr>
           <a:xfrm>
             <a:off x="1295400" y="1601655"/>
-            <a:ext cx="7391400" cy="1631216"/>
+            <a:ext cx="7391400" cy="2015936"/>
           </a:xfrm>
           <a:prstGeom prst="rect">
             <a:avLst/>
@@ -17169,7 +17391,105 @@
                 <a:latin typeface="Times New Roman" panose="02020603050405020304" pitchFamily="18" charset="0"/>
                 <a:ea typeface="Calibri" panose="020F0502020204030204" pitchFamily="34" charset="0"/>
               </a:rPr>
-              <a:t>Phần mềm có các chức năng đăng nhập, đổi mật khẩu, xem và sửa thông tin cho các cán bộ. Ngoài ra còn có thêm tài khoản Admin, là người trực tiếp làm việc với CSDL do đó có thể toàn quyền quản lý hệ thống</a:t>
+              <a:t>Phần mềm có các chức năng đăng nhập, đổi mật khẩu, xem và sửa thông tin cho các cán bộ. Ngoài ra còn có thêm tài </a:t>
+            </a:r>
+            <a:r>
+              <a:rPr lang="en-US" sz="2500" dirty="0" err="1">
+                <a:latin typeface="Times New Roman" panose="02020603050405020304" pitchFamily="18" charset="0"/>
+                <a:ea typeface="Calibri" panose="020F0502020204030204" pitchFamily="34" charset="0"/>
+              </a:rPr>
+              <a:t>khoản</a:t>
+            </a:r>
+            <a:r>
+              <a:rPr lang="en-US" sz="2500" dirty="0">
+                <a:latin typeface="Times New Roman" panose="02020603050405020304" pitchFamily="18" charset="0"/>
+                <a:ea typeface="Calibri" panose="020F0502020204030204" pitchFamily="34" charset="0"/>
+              </a:rPr>
+              <a:t> </a:t>
+            </a:r>
+            <a:r>
+              <a:rPr lang="en-US" sz="2500" dirty="0" err="1">
+                <a:latin typeface="Times New Roman" panose="02020603050405020304" pitchFamily="18" charset="0"/>
+                <a:ea typeface="Calibri" panose="020F0502020204030204" pitchFamily="34" charset="0"/>
+              </a:rPr>
+              <a:t>phân</a:t>
+            </a:r>
+            <a:r>
+              <a:rPr lang="en-US" sz="2500" dirty="0">
+                <a:latin typeface="Times New Roman" panose="02020603050405020304" pitchFamily="18" charset="0"/>
+                <a:ea typeface="Calibri" panose="020F0502020204030204" pitchFamily="34" charset="0"/>
+              </a:rPr>
+              <a:t> </a:t>
+            </a:r>
+            <a:r>
+              <a:rPr lang="en-US" sz="2500" dirty="0" err="1">
+                <a:latin typeface="Times New Roman" panose="02020603050405020304" pitchFamily="18" charset="0"/>
+                <a:ea typeface="Calibri" panose="020F0502020204030204" pitchFamily="34" charset="0"/>
+              </a:rPr>
+              <a:t>quyền</a:t>
+            </a:r>
+            <a:r>
+              <a:rPr lang="en-US" sz="2500" dirty="0">
+                <a:latin typeface="Times New Roman" panose="02020603050405020304" pitchFamily="18" charset="0"/>
+                <a:ea typeface="Calibri" panose="020F0502020204030204" pitchFamily="34" charset="0"/>
+              </a:rPr>
+              <a:t> </a:t>
+            </a:r>
+            <a:r>
+              <a:rPr lang="en-US" sz="2500" dirty="0" err="1">
+                <a:latin typeface="Times New Roman" panose="02020603050405020304" pitchFamily="18" charset="0"/>
+                <a:ea typeface="Calibri" panose="020F0502020204030204" pitchFamily="34" charset="0"/>
+              </a:rPr>
+              <a:t>cán</a:t>
+            </a:r>
+            <a:r>
+              <a:rPr lang="en-US" sz="2500" dirty="0">
+                <a:latin typeface="Times New Roman" panose="02020603050405020304" pitchFamily="18" charset="0"/>
+                <a:ea typeface="Calibri" panose="020F0502020204030204" pitchFamily="34" charset="0"/>
+              </a:rPr>
+              <a:t> </a:t>
+            </a:r>
+            <a:r>
+              <a:rPr lang="en-US" sz="2500" dirty="0" err="1">
+                <a:latin typeface="Times New Roman" panose="02020603050405020304" pitchFamily="18" charset="0"/>
+                <a:ea typeface="Calibri" panose="020F0502020204030204" pitchFamily="34" charset="0"/>
+              </a:rPr>
+              <a:t>bộ</a:t>
+            </a:r>
+            <a:r>
+              <a:rPr lang="en-US" sz="2500" dirty="0">
+                <a:latin typeface="Times New Roman" panose="02020603050405020304" pitchFamily="18" charset="0"/>
+                <a:ea typeface="Calibri" panose="020F0502020204030204" pitchFamily="34" charset="0"/>
+              </a:rPr>
+              <a:t> </a:t>
+            </a:r>
+            <a:r>
+              <a:rPr lang="en-US" sz="2500" dirty="0" err="1">
+                <a:latin typeface="Times New Roman" panose="02020603050405020304" pitchFamily="18" charset="0"/>
+                <a:ea typeface="Calibri" panose="020F0502020204030204" pitchFamily="34" charset="0"/>
+              </a:rPr>
+              <a:t>dữ</a:t>
+            </a:r>
+            <a:r>
+              <a:rPr lang="en-US" sz="2500" dirty="0">
+                <a:latin typeface="Times New Roman" panose="02020603050405020304" pitchFamily="18" charset="0"/>
+                <a:ea typeface="Calibri" panose="020F0502020204030204" pitchFamily="34" charset="0"/>
+              </a:rPr>
+              <a:t> </a:t>
+            </a:r>
+            <a:r>
+              <a:rPr lang="en-US" sz="2500" dirty="0" err="1">
+                <a:latin typeface="Times New Roman" panose="02020603050405020304" pitchFamily="18" charset="0"/>
+                <a:ea typeface="Calibri" panose="020F0502020204030204" pitchFamily="34" charset="0"/>
+              </a:rPr>
+              <a:t>liệu</a:t>
+            </a:r>
+            <a:r>
+              <a:rPr lang="en-US" sz="2500" dirty="0">
+                <a:latin typeface="Times New Roman" panose="02020603050405020304" pitchFamily="18" charset="0"/>
+                <a:ea typeface="Calibri" panose="020F0502020204030204" pitchFamily="34" charset="0"/>
+              </a:rPr>
+              <a:t>, là người trực tiếp làm việc với CSDL do đó có thể toàn quyền quản lý hệ thống</a:t>
             </a:r>
             <a:endParaRPr lang="vi-VN" sz="2500" dirty="0"/>
           </a:p>
@@ -17217,13 +17537,6 @@
   <p:clrMapOvr>
     <a:masterClrMapping/>
   </p:clrMapOvr>
-  <p:timing>
-    <p:tnLst>
-      <p:par>
-        <p:cTn id="1" dur="indefinite" restart="never" nodeType="tmRoot"/>
-      </p:par>
-    </p:tnLst>
-  </p:timing>
 </p:sld>
 </file>
 

</xml_diff>